<commit_message>
Presentation Plan and Challenge, added graph. All done
</commit_message>
<xml_diff>
--- a/docs/presentation-proposal/Presentation_Plan and Challenge.pptx
+++ b/docs/presentation-proposal/Presentation_Plan and Challenge.pptx
@@ -108,6 +108,11 @@
       </a:defRPr>
     </a:lvl9pPr>
   </p:defaultTextStyle>
+  <p:extLst>
+    <p:ext uri="{EFAFB233-063F-42B5-8137-9DF3F51BA10A}">
+      <p15:sldGuideLst xmlns:p15="http://schemas.microsoft.com/office/powerpoint/2012/main"/>
+    </p:ext>
+  </p:extLst>
 </p:presentation>
 </file>
 
@@ -193,7 +198,7 @@
           <a:p>
             <a:fld id="{2B491CB4-1579-46A4-AD8E-B68C9A769D13}" type="datetimeFigureOut">
               <a:rPr lang="en-CA" smtClean="0"/>
-              <a:t>2013-10-02</a:t>
+              <a:t>2013-10-03</a:t>
             </a:fld>
             <a:endParaRPr lang="en-CA"/>
           </a:p>
@@ -545,6 +550,90 @@
 </p:notes>
 </file>
 
+<file path=ppt/notesSlides/notesSlide2.xml><?xml version="1.0" encoding="utf-8"?>
+<p:notes xmlns:a="http://schemas.openxmlformats.org/drawingml/2006/main" xmlns:r="http://schemas.openxmlformats.org/officeDocument/2006/relationships" xmlns:p="http://schemas.openxmlformats.org/presentationml/2006/main">
+  <p:cSld>
+    <p:spTree>
+      <p:nvGrpSpPr>
+        <p:cNvPr id="1" name=""/>
+        <p:cNvGrpSpPr/>
+        <p:nvPr/>
+      </p:nvGrpSpPr>
+      <p:grpSpPr>
+        <a:xfrm>
+          <a:off x="0" y="0"/>
+          <a:ext cx="0" cy="0"/>
+          <a:chOff x="0" y="0"/>
+          <a:chExt cx="0" cy="0"/>
+        </a:xfrm>
+      </p:grpSpPr>
+      <p:sp>
+        <p:nvSpPr>
+          <p:cNvPr id="2" name="Slide Image Placeholder 1"/>
+          <p:cNvSpPr>
+            <a:spLocks noGrp="1" noRot="1" noChangeAspect="1"/>
+          </p:cNvSpPr>
+          <p:nvPr>
+            <p:ph type="sldImg"/>
+          </p:nvPr>
+        </p:nvSpPr>
+        <p:spPr/>
+      </p:sp>
+      <p:sp>
+        <p:nvSpPr>
+          <p:cNvPr id="3" name="Notes Placeholder 2"/>
+          <p:cNvSpPr>
+            <a:spLocks noGrp="1"/>
+          </p:cNvSpPr>
+          <p:nvPr>
+            <p:ph type="body" idx="1"/>
+          </p:nvPr>
+        </p:nvSpPr>
+        <p:spPr/>
+        <p:txBody>
+          <a:bodyPr/>
+          <a:lstStyle/>
+          <a:p>
+            <a:endParaRPr lang="en-CA" dirty="0"/>
+          </a:p>
+        </p:txBody>
+      </p:sp>
+      <p:sp>
+        <p:nvSpPr>
+          <p:cNvPr id="4" name="Slide Number Placeholder 3"/>
+          <p:cNvSpPr>
+            <a:spLocks noGrp="1"/>
+          </p:cNvSpPr>
+          <p:nvPr>
+            <p:ph type="sldNum" sz="quarter" idx="10"/>
+          </p:nvPr>
+        </p:nvSpPr>
+        <p:spPr/>
+        <p:txBody>
+          <a:bodyPr/>
+          <a:lstStyle/>
+          <a:p>
+            <a:fld id="{A65087DF-A252-433C-A54F-35F1BAC6DEB9}" type="slidenum">
+              <a:rPr lang="en-CA" smtClean="0"/>
+              <a:t>2</a:t>
+            </a:fld>
+            <a:endParaRPr lang="en-CA"/>
+          </a:p>
+        </p:txBody>
+      </p:sp>
+    </p:spTree>
+    <p:extLst>
+      <p:ext uri="{BB962C8B-B14F-4D97-AF65-F5344CB8AC3E}">
+        <p14:creationId xmlns:p14="http://schemas.microsoft.com/office/powerpoint/2010/main" val="1146942259"/>
+      </p:ext>
+    </p:extLst>
+  </p:cSld>
+  <p:clrMapOvr>
+    <a:masterClrMapping/>
+  </p:clrMapOvr>
+</p:notes>
+</file>
+
 <file path=ppt/slideLayouts/slideLayout1.xml><?xml version="1.0" encoding="utf-8"?>
 <p:sldLayout xmlns:a="http://schemas.openxmlformats.org/drawingml/2006/main" xmlns:r="http://schemas.openxmlformats.org/officeDocument/2006/relationships" xmlns:p="http://schemas.openxmlformats.org/presentationml/2006/main" type="title" preserve="1">
   <p:cSld name="Title Slide">
@@ -676,7 +765,7 @@
           <a:p>
             <a:fld id="{76AB1907-1315-4150-90A9-DD36A1A3E326}" type="datetimeFigureOut">
               <a:rPr lang="en-CA" smtClean="0"/>
-              <a:t>2013-10-02</a:t>
+              <a:t>2013-10-03</a:t>
             </a:fld>
             <a:endParaRPr lang="en-CA"/>
           </a:p>
@@ -846,7 +935,7 @@
           <a:p>
             <a:fld id="{76AB1907-1315-4150-90A9-DD36A1A3E326}" type="datetimeFigureOut">
               <a:rPr lang="en-CA" smtClean="0"/>
-              <a:t>2013-10-02</a:t>
+              <a:t>2013-10-03</a:t>
             </a:fld>
             <a:endParaRPr lang="en-CA"/>
           </a:p>
@@ -1026,7 +1115,7 @@
           <a:p>
             <a:fld id="{76AB1907-1315-4150-90A9-DD36A1A3E326}" type="datetimeFigureOut">
               <a:rPr lang="en-CA" smtClean="0"/>
-              <a:t>2013-10-02</a:t>
+              <a:t>2013-10-03</a:t>
             </a:fld>
             <a:endParaRPr lang="en-CA"/>
           </a:p>
@@ -1196,7 +1285,7 @@
           <a:p>
             <a:fld id="{76AB1907-1315-4150-90A9-DD36A1A3E326}" type="datetimeFigureOut">
               <a:rPr lang="en-CA" smtClean="0"/>
-              <a:t>2013-10-02</a:t>
+              <a:t>2013-10-03</a:t>
             </a:fld>
             <a:endParaRPr lang="en-CA"/>
           </a:p>
@@ -1442,7 +1531,7 @@
           <a:p>
             <a:fld id="{76AB1907-1315-4150-90A9-DD36A1A3E326}" type="datetimeFigureOut">
               <a:rPr lang="en-CA" smtClean="0"/>
-              <a:t>2013-10-02</a:t>
+              <a:t>2013-10-03</a:t>
             </a:fld>
             <a:endParaRPr lang="en-CA"/>
           </a:p>
@@ -1674,7 +1763,7 @@
           <a:p>
             <a:fld id="{76AB1907-1315-4150-90A9-DD36A1A3E326}" type="datetimeFigureOut">
               <a:rPr lang="en-CA" smtClean="0"/>
-              <a:t>2013-10-02</a:t>
+              <a:t>2013-10-03</a:t>
             </a:fld>
             <a:endParaRPr lang="en-CA"/>
           </a:p>
@@ -2041,7 +2130,7 @@
           <a:p>
             <a:fld id="{76AB1907-1315-4150-90A9-DD36A1A3E326}" type="datetimeFigureOut">
               <a:rPr lang="en-CA" smtClean="0"/>
-              <a:t>2013-10-02</a:t>
+              <a:t>2013-10-03</a:t>
             </a:fld>
             <a:endParaRPr lang="en-CA"/>
           </a:p>
@@ -2159,7 +2248,7 @@
           <a:p>
             <a:fld id="{76AB1907-1315-4150-90A9-DD36A1A3E326}" type="datetimeFigureOut">
               <a:rPr lang="en-CA" smtClean="0"/>
-              <a:t>2013-10-02</a:t>
+              <a:t>2013-10-03</a:t>
             </a:fld>
             <a:endParaRPr lang="en-CA"/>
           </a:p>
@@ -2254,7 +2343,7 @@
           <a:p>
             <a:fld id="{76AB1907-1315-4150-90A9-DD36A1A3E326}" type="datetimeFigureOut">
               <a:rPr lang="en-CA" smtClean="0"/>
-              <a:t>2013-10-02</a:t>
+              <a:t>2013-10-03</a:t>
             </a:fld>
             <a:endParaRPr lang="en-CA"/>
           </a:p>
@@ -2531,7 +2620,7 @@
           <a:p>
             <a:fld id="{76AB1907-1315-4150-90A9-DD36A1A3E326}" type="datetimeFigureOut">
               <a:rPr lang="en-CA" smtClean="0"/>
-              <a:t>2013-10-02</a:t>
+              <a:t>2013-10-03</a:t>
             </a:fld>
             <a:endParaRPr lang="en-CA"/>
           </a:p>
@@ -2784,7 +2873,7 @@
           <a:p>
             <a:fld id="{76AB1907-1315-4150-90A9-DD36A1A3E326}" type="datetimeFigureOut">
               <a:rPr lang="en-CA" smtClean="0"/>
-              <a:t>2013-10-02</a:t>
+              <a:t>2013-10-03</a:t>
             </a:fld>
             <a:endParaRPr lang="en-CA"/>
           </a:p>
@@ -2997,7 +3086,7 @@
           <a:p>
             <a:fld id="{76AB1907-1315-4150-90A9-DD36A1A3E326}" type="datetimeFigureOut">
               <a:rPr lang="en-CA" smtClean="0"/>
-              <a:t>2013-10-02</a:t>
+              <a:t>2013-10-03</a:t>
             </a:fld>
             <a:endParaRPr lang="en-CA"/>
           </a:p>
@@ -4485,7 +4574,7 @@
           <a:p>
             <a:r>
               <a:rPr lang="en-CA" dirty="0" smtClean="0"/>
-              <a:t>Database</a:t>
+              <a:t>1.Database</a:t>
             </a:r>
             <a:endParaRPr lang="en-CA" dirty="0"/>
           </a:p>
@@ -4515,8 +4604,9 @@
           <a:p>
             <a:r>
               <a:rPr lang="en-CA" dirty="0" smtClean="0"/>
-              <a:t>Algorithm</a:t>
-            </a:r>
+              <a:t>2.Algorithm</a:t>
+            </a:r>
+            <a:endParaRPr lang="en-CA" dirty="0" smtClean="0"/>
           </a:p>
           <a:p>
             <a:endParaRPr lang="en-CA" dirty="0"/>
@@ -4561,13 +4651,2035 @@
       </p:sp>
       <p:sp>
         <p:nvSpPr>
-          <p:cNvPr id="8" name="TextBox 7"/>
+          <p:cNvPr id="2" name="Rectangle 1"/>
+          <p:cNvSpPr/>
+          <p:nvPr/>
+        </p:nvSpPr>
+        <p:spPr>
+          <a:xfrm>
+            <a:off x="2654300" y="3605986"/>
+            <a:ext cx="342900" cy="226636"/>
+          </a:xfrm>
+          <a:prstGeom prst="rect">
+            <a:avLst/>
+          </a:prstGeom>
+        </p:spPr>
+        <p:style>
+          <a:lnRef idx="2">
+            <a:schemeClr val="accent1">
+              <a:shade val="50000"/>
+            </a:schemeClr>
+          </a:lnRef>
+          <a:fillRef idx="1">
+            <a:schemeClr val="accent1"/>
+          </a:fillRef>
+          <a:effectRef idx="0">
+            <a:schemeClr val="accent1"/>
+          </a:effectRef>
+          <a:fontRef idx="minor">
+            <a:schemeClr val="lt1"/>
+          </a:fontRef>
+        </p:style>
+        <p:txBody>
+          <a:bodyPr rtlCol="0" anchor="ctr"/>
+          <a:lstStyle/>
+          <a:p>
+            <a:pPr algn="ctr"/>
+            <a:endParaRPr lang="en-CA"/>
+          </a:p>
+        </p:txBody>
+      </p:sp>
+      <p:sp>
+        <p:nvSpPr>
+          <p:cNvPr id="9" name="Rectangle 8"/>
+          <p:cNvSpPr/>
+          <p:nvPr/>
+        </p:nvSpPr>
+        <p:spPr>
+          <a:xfrm>
+            <a:off x="2654300" y="3848874"/>
+            <a:ext cx="342900" cy="226636"/>
+          </a:xfrm>
+          <a:prstGeom prst="rect">
+            <a:avLst/>
+          </a:prstGeom>
+        </p:spPr>
+        <p:style>
+          <a:lnRef idx="2">
+            <a:schemeClr val="accent1">
+              <a:shade val="50000"/>
+            </a:schemeClr>
+          </a:lnRef>
+          <a:fillRef idx="1">
+            <a:schemeClr val="accent1"/>
+          </a:fillRef>
+          <a:effectRef idx="0">
+            <a:schemeClr val="accent1"/>
+          </a:effectRef>
+          <a:fontRef idx="minor">
+            <a:schemeClr val="lt1"/>
+          </a:fontRef>
+        </p:style>
+        <p:txBody>
+          <a:bodyPr rtlCol="0" anchor="ctr"/>
+          <a:lstStyle/>
+          <a:p>
+            <a:pPr algn="ctr"/>
+            <a:endParaRPr lang="en-CA"/>
+          </a:p>
+        </p:txBody>
+      </p:sp>
+      <p:sp>
+        <p:nvSpPr>
+          <p:cNvPr id="10" name="Rectangle 9"/>
+          <p:cNvSpPr/>
+          <p:nvPr/>
+        </p:nvSpPr>
+        <p:spPr>
+          <a:xfrm>
+            <a:off x="2654300" y="4091762"/>
+            <a:ext cx="342900" cy="226636"/>
+          </a:xfrm>
+          <a:prstGeom prst="rect">
+            <a:avLst/>
+          </a:prstGeom>
+        </p:spPr>
+        <p:style>
+          <a:lnRef idx="2">
+            <a:schemeClr val="accent1">
+              <a:shade val="50000"/>
+            </a:schemeClr>
+          </a:lnRef>
+          <a:fillRef idx="1">
+            <a:schemeClr val="accent1"/>
+          </a:fillRef>
+          <a:effectRef idx="0">
+            <a:schemeClr val="accent1"/>
+          </a:effectRef>
+          <a:fontRef idx="minor">
+            <a:schemeClr val="lt1"/>
+          </a:fontRef>
+        </p:style>
+        <p:txBody>
+          <a:bodyPr rot="0" spcFirstLastPara="0" vert="horz" wrap="square" lIns="91440" tIns="45720" rIns="91440" bIns="45720" numCol="1" spcCol="0" rtlCol="0" fromWordArt="0" anchor="ctr" anchorCtr="0" forceAA="0" compatLnSpc="1">
+            <a:prstTxWarp prst="textNoShape">
+              <a:avLst/>
+            </a:prstTxWarp>
+            <a:noAutofit/>
+          </a:bodyPr>
+          <a:lstStyle>
+            <a:defPPr>
+              <a:defRPr lang="en-US"/>
+            </a:defPPr>
+            <a:lvl1pPr marL="0" algn="l" defTabSz="914400" rtl="0" eaLnBrk="1" latinLnBrk="0" hangingPunct="1">
+              <a:defRPr sz="1800" kern="1200">
+                <a:solidFill>
+                  <a:schemeClr val="lt1"/>
+                </a:solidFill>
+                <a:latin typeface="+mn-lt"/>
+                <a:ea typeface="+mn-ea"/>
+                <a:cs typeface="+mn-cs"/>
+              </a:defRPr>
+            </a:lvl1pPr>
+            <a:lvl2pPr marL="457200" algn="l" defTabSz="914400" rtl="0" eaLnBrk="1" latinLnBrk="0" hangingPunct="1">
+              <a:defRPr sz="1800" kern="1200">
+                <a:solidFill>
+                  <a:schemeClr val="lt1"/>
+                </a:solidFill>
+                <a:latin typeface="+mn-lt"/>
+                <a:ea typeface="+mn-ea"/>
+                <a:cs typeface="+mn-cs"/>
+              </a:defRPr>
+            </a:lvl2pPr>
+            <a:lvl3pPr marL="914400" algn="l" defTabSz="914400" rtl="0" eaLnBrk="1" latinLnBrk="0" hangingPunct="1">
+              <a:defRPr sz="1800" kern="1200">
+                <a:solidFill>
+                  <a:schemeClr val="lt1"/>
+                </a:solidFill>
+                <a:latin typeface="+mn-lt"/>
+                <a:ea typeface="+mn-ea"/>
+                <a:cs typeface="+mn-cs"/>
+              </a:defRPr>
+            </a:lvl3pPr>
+            <a:lvl4pPr marL="1371600" algn="l" defTabSz="914400" rtl="0" eaLnBrk="1" latinLnBrk="0" hangingPunct="1">
+              <a:defRPr sz="1800" kern="1200">
+                <a:solidFill>
+                  <a:schemeClr val="lt1"/>
+                </a:solidFill>
+                <a:latin typeface="+mn-lt"/>
+                <a:ea typeface="+mn-ea"/>
+                <a:cs typeface="+mn-cs"/>
+              </a:defRPr>
+            </a:lvl4pPr>
+            <a:lvl5pPr marL="1828800" algn="l" defTabSz="914400" rtl="0" eaLnBrk="1" latinLnBrk="0" hangingPunct="1">
+              <a:defRPr sz="1800" kern="1200">
+                <a:solidFill>
+                  <a:schemeClr val="lt1"/>
+                </a:solidFill>
+                <a:latin typeface="+mn-lt"/>
+                <a:ea typeface="+mn-ea"/>
+                <a:cs typeface="+mn-cs"/>
+              </a:defRPr>
+            </a:lvl5pPr>
+            <a:lvl6pPr marL="2286000" algn="l" defTabSz="914400" rtl="0" eaLnBrk="1" latinLnBrk="0" hangingPunct="1">
+              <a:defRPr sz="1800" kern="1200">
+                <a:solidFill>
+                  <a:schemeClr val="lt1"/>
+                </a:solidFill>
+                <a:latin typeface="+mn-lt"/>
+                <a:ea typeface="+mn-ea"/>
+                <a:cs typeface="+mn-cs"/>
+              </a:defRPr>
+            </a:lvl6pPr>
+            <a:lvl7pPr marL="2743200" algn="l" defTabSz="914400" rtl="0" eaLnBrk="1" latinLnBrk="0" hangingPunct="1">
+              <a:defRPr sz="1800" kern="1200">
+                <a:solidFill>
+                  <a:schemeClr val="lt1"/>
+                </a:solidFill>
+                <a:latin typeface="+mn-lt"/>
+                <a:ea typeface="+mn-ea"/>
+                <a:cs typeface="+mn-cs"/>
+              </a:defRPr>
+            </a:lvl7pPr>
+            <a:lvl8pPr marL="3200400" algn="l" defTabSz="914400" rtl="0" eaLnBrk="1" latinLnBrk="0" hangingPunct="1">
+              <a:defRPr sz="1800" kern="1200">
+                <a:solidFill>
+                  <a:schemeClr val="lt1"/>
+                </a:solidFill>
+                <a:latin typeface="+mn-lt"/>
+                <a:ea typeface="+mn-ea"/>
+                <a:cs typeface="+mn-cs"/>
+              </a:defRPr>
+            </a:lvl8pPr>
+            <a:lvl9pPr marL="3657600" algn="l" defTabSz="914400" rtl="0" eaLnBrk="1" latinLnBrk="0" hangingPunct="1">
+              <a:defRPr sz="1800" kern="1200">
+                <a:solidFill>
+                  <a:schemeClr val="lt1"/>
+                </a:solidFill>
+                <a:latin typeface="+mn-lt"/>
+                <a:ea typeface="+mn-ea"/>
+                <a:cs typeface="+mn-cs"/>
+              </a:defRPr>
+            </a:lvl9pPr>
+          </a:lstStyle>
+          <a:p>
+            <a:pPr algn="ctr"/>
+            <a:endParaRPr lang="en-CA"/>
+          </a:p>
+        </p:txBody>
+      </p:sp>
+      <p:sp>
+        <p:nvSpPr>
+          <p:cNvPr id="3" name="Rectangle 2"/>
+          <p:cNvSpPr/>
+          <p:nvPr/>
+        </p:nvSpPr>
+        <p:spPr>
+          <a:xfrm>
+            <a:off x="2654300" y="4344188"/>
+            <a:ext cx="238125" cy="152400"/>
+          </a:xfrm>
+          <a:prstGeom prst="rect">
+            <a:avLst/>
+          </a:prstGeom>
+        </p:spPr>
+        <p:style>
+          <a:lnRef idx="2">
+            <a:schemeClr val="accent2">
+              <a:shade val="50000"/>
+            </a:schemeClr>
+          </a:lnRef>
+          <a:fillRef idx="1">
+            <a:schemeClr val="accent2"/>
+          </a:fillRef>
+          <a:effectRef idx="0">
+            <a:schemeClr val="accent2"/>
+          </a:effectRef>
+          <a:fontRef idx="minor">
+            <a:schemeClr val="lt1"/>
+          </a:fontRef>
+        </p:style>
+        <p:txBody>
+          <a:bodyPr rtlCol="0" anchor="ctr"/>
+          <a:lstStyle/>
+          <a:p>
+            <a:pPr algn="ctr"/>
+            <a:endParaRPr lang="en-CA">
+              <a:solidFill>
+                <a:srgbClr val="FF0000"/>
+              </a:solidFill>
+            </a:endParaRPr>
+          </a:p>
+        </p:txBody>
+      </p:sp>
+      <p:sp>
+        <p:nvSpPr>
+          <p:cNvPr id="12" name="Rectangle 11"/>
+          <p:cNvSpPr/>
+          <p:nvPr/>
+        </p:nvSpPr>
+        <p:spPr>
+          <a:xfrm>
+            <a:off x="3987699" y="5800073"/>
+            <a:ext cx="66880" cy="151620"/>
+          </a:xfrm>
+          <a:prstGeom prst="rect">
+            <a:avLst/>
+          </a:prstGeom>
+        </p:spPr>
+        <p:style>
+          <a:lnRef idx="2">
+            <a:schemeClr val="accent1">
+              <a:shade val="50000"/>
+            </a:schemeClr>
+          </a:lnRef>
+          <a:fillRef idx="1">
+            <a:schemeClr val="accent1"/>
+          </a:fillRef>
+          <a:effectRef idx="0">
+            <a:schemeClr val="accent1"/>
+          </a:effectRef>
+          <a:fontRef idx="minor">
+            <a:schemeClr val="lt1"/>
+          </a:fontRef>
+        </p:style>
+        <p:txBody>
+          <a:bodyPr rtlCol="0" anchor="ctr"/>
+          <a:lstStyle/>
+          <a:p>
+            <a:pPr algn="ctr"/>
+            <a:endParaRPr lang="en-CA"/>
+          </a:p>
+        </p:txBody>
+      </p:sp>
+      <p:sp>
+        <p:nvSpPr>
+          <p:cNvPr id="13" name="Rectangle 12"/>
+          <p:cNvSpPr/>
+          <p:nvPr/>
+        </p:nvSpPr>
+        <p:spPr>
+          <a:xfrm>
+            <a:off x="3201987" y="3605986"/>
+            <a:ext cx="342900" cy="226636"/>
+          </a:xfrm>
+          <a:prstGeom prst="rect">
+            <a:avLst/>
+          </a:prstGeom>
+        </p:spPr>
+        <p:style>
+          <a:lnRef idx="2">
+            <a:schemeClr val="accent1">
+              <a:shade val="50000"/>
+            </a:schemeClr>
+          </a:lnRef>
+          <a:fillRef idx="1">
+            <a:schemeClr val="accent1"/>
+          </a:fillRef>
+          <a:effectRef idx="0">
+            <a:schemeClr val="accent1"/>
+          </a:effectRef>
+          <a:fontRef idx="minor">
+            <a:schemeClr val="lt1"/>
+          </a:fontRef>
+        </p:style>
+        <p:txBody>
+          <a:bodyPr rtlCol="0" anchor="ctr"/>
+          <a:lstStyle/>
+          <a:p>
+            <a:pPr algn="ctr"/>
+            <a:endParaRPr lang="en-CA"/>
+          </a:p>
+        </p:txBody>
+      </p:sp>
+      <p:sp>
+        <p:nvSpPr>
+          <p:cNvPr id="14" name="Rectangle 13"/>
+          <p:cNvSpPr/>
+          <p:nvPr/>
+        </p:nvSpPr>
+        <p:spPr>
+          <a:xfrm>
+            <a:off x="3201987" y="3848874"/>
+            <a:ext cx="342900" cy="226636"/>
+          </a:xfrm>
+          <a:prstGeom prst="rect">
+            <a:avLst/>
+          </a:prstGeom>
+        </p:spPr>
+        <p:style>
+          <a:lnRef idx="3">
+            <a:schemeClr val="lt1"/>
+          </a:lnRef>
+          <a:fillRef idx="1">
+            <a:schemeClr val="accent2"/>
+          </a:fillRef>
+          <a:effectRef idx="1">
+            <a:schemeClr val="accent2"/>
+          </a:effectRef>
+          <a:fontRef idx="minor">
+            <a:schemeClr val="lt1"/>
+          </a:fontRef>
+        </p:style>
+        <p:txBody>
+          <a:bodyPr rtlCol="0" anchor="ctr"/>
+          <a:lstStyle/>
+          <a:p>
+            <a:pPr algn="ctr"/>
+            <a:endParaRPr lang="en-CA"/>
+          </a:p>
+        </p:txBody>
+      </p:sp>
+      <p:sp>
+        <p:nvSpPr>
+          <p:cNvPr id="15" name="Rectangle 14"/>
+          <p:cNvSpPr/>
+          <p:nvPr/>
+        </p:nvSpPr>
+        <p:spPr>
+          <a:xfrm>
+            <a:off x="3201987" y="4091762"/>
+            <a:ext cx="342900" cy="226636"/>
+          </a:xfrm>
+          <a:prstGeom prst="rect">
+            <a:avLst/>
+          </a:prstGeom>
+        </p:spPr>
+        <p:style>
+          <a:lnRef idx="2">
+            <a:schemeClr val="accent1">
+              <a:shade val="50000"/>
+            </a:schemeClr>
+          </a:lnRef>
+          <a:fillRef idx="1">
+            <a:schemeClr val="accent1"/>
+          </a:fillRef>
+          <a:effectRef idx="0">
+            <a:schemeClr val="accent1"/>
+          </a:effectRef>
+          <a:fontRef idx="minor">
+            <a:schemeClr val="lt1"/>
+          </a:fontRef>
+        </p:style>
+        <p:txBody>
+          <a:bodyPr rot="0" spcFirstLastPara="0" vert="horz" wrap="square" lIns="91440" tIns="45720" rIns="91440" bIns="45720" numCol="1" spcCol="0" rtlCol="0" fromWordArt="0" anchor="ctr" anchorCtr="0" forceAA="0" compatLnSpc="1">
+            <a:prstTxWarp prst="textNoShape">
+              <a:avLst/>
+            </a:prstTxWarp>
+            <a:noAutofit/>
+          </a:bodyPr>
+          <a:lstStyle>
+            <a:defPPr>
+              <a:defRPr lang="en-US"/>
+            </a:defPPr>
+            <a:lvl1pPr marL="0" algn="l" defTabSz="914400" rtl="0" eaLnBrk="1" latinLnBrk="0" hangingPunct="1">
+              <a:defRPr sz="1800" kern="1200">
+                <a:solidFill>
+                  <a:schemeClr val="lt1"/>
+                </a:solidFill>
+                <a:latin typeface="+mn-lt"/>
+                <a:ea typeface="+mn-ea"/>
+                <a:cs typeface="+mn-cs"/>
+              </a:defRPr>
+            </a:lvl1pPr>
+            <a:lvl2pPr marL="457200" algn="l" defTabSz="914400" rtl="0" eaLnBrk="1" latinLnBrk="0" hangingPunct="1">
+              <a:defRPr sz="1800" kern="1200">
+                <a:solidFill>
+                  <a:schemeClr val="lt1"/>
+                </a:solidFill>
+                <a:latin typeface="+mn-lt"/>
+                <a:ea typeface="+mn-ea"/>
+                <a:cs typeface="+mn-cs"/>
+              </a:defRPr>
+            </a:lvl2pPr>
+            <a:lvl3pPr marL="914400" algn="l" defTabSz="914400" rtl="0" eaLnBrk="1" latinLnBrk="0" hangingPunct="1">
+              <a:defRPr sz="1800" kern="1200">
+                <a:solidFill>
+                  <a:schemeClr val="lt1"/>
+                </a:solidFill>
+                <a:latin typeface="+mn-lt"/>
+                <a:ea typeface="+mn-ea"/>
+                <a:cs typeface="+mn-cs"/>
+              </a:defRPr>
+            </a:lvl3pPr>
+            <a:lvl4pPr marL="1371600" algn="l" defTabSz="914400" rtl="0" eaLnBrk="1" latinLnBrk="0" hangingPunct="1">
+              <a:defRPr sz="1800" kern="1200">
+                <a:solidFill>
+                  <a:schemeClr val="lt1"/>
+                </a:solidFill>
+                <a:latin typeface="+mn-lt"/>
+                <a:ea typeface="+mn-ea"/>
+                <a:cs typeface="+mn-cs"/>
+              </a:defRPr>
+            </a:lvl4pPr>
+            <a:lvl5pPr marL="1828800" algn="l" defTabSz="914400" rtl="0" eaLnBrk="1" latinLnBrk="0" hangingPunct="1">
+              <a:defRPr sz="1800" kern="1200">
+                <a:solidFill>
+                  <a:schemeClr val="lt1"/>
+                </a:solidFill>
+                <a:latin typeface="+mn-lt"/>
+                <a:ea typeface="+mn-ea"/>
+                <a:cs typeface="+mn-cs"/>
+              </a:defRPr>
+            </a:lvl5pPr>
+            <a:lvl6pPr marL="2286000" algn="l" defTabSz="914400" rtl="0" eaLnBrk="1" latinLnBrk="0" hangingPunct="1">
+              <a:defRPr sz="1800" kern="1200">
+                <a:solidFill>
+                  <a:schemeClr val="lt1"/>
+                </a:solidFill>
+                <a:latin typeface="+mn-lt"/>
+                <a:ea typeface="+mn-ea"/>
+                <a:cs typeface="+mn-cs"/>
+              </a:defRPr>
+            </a:lvl6pPr>
+            <a:lvl7pPr marL="2743200" algn="l" defTabSz="914400" rtl="0" eaLnBrk="1" latinLnBrk="0" hangingPunct="1">
+              <a:defRPr sz="1800" kern="1200">
+                <a:solidFill>
+                  <a:schemeClr val="lt1"/>
+                </a:solidFill>
+                <a:latin typeface="+mn-lt"/>
+                <a:ea typeface="+mn-ea"/>
+                <a:cs typeface="+mn-cs"/>
+              </a:defRPr>
+            </a:lvl7pPr>
+            <a:lvl8pPr marL="3200400" algn="l" defTabSz="914400" rtl="0" eaLnBrk="1" latinLnBrk="0" hangingPunct="1">
+              <a:defRPr sz="1800" kern="1200">
+                <a:solidFill>
+                  <a:schemeClr val="lt1"/>
+                </a:solidFill>
+                <a:latin typeface="+mn-lt"/>
+                <a:ea typeface="+mn-ea"/>
+                <a:cs typeface="+mn-cs"/>
+              </a:defRPr>
+            </a:lvl8pPr>
+            <a:lvl9pPr marL="3657600" algn="l" defTabSz="914400" rtl="0" eaLnBrk="1" latinLnBrk="0" hangingPunct="1">
+              <a:defRPr sz="1800" kern="1200">
+                <a:solidFill>
+                  <a:schemeClr val="lt1"/>
+                </a:solidFill>
+                <a:latin typeface="+mn-lt"/>
+                <a:ea typeface="+mn-ea"/>
+                <a:cs typeface="+mn-cs"/>
+              </a:defRPr>
+            </a:lvl9pPr>
+          </a:lstStyle>
+          <a:p>
+            <a:pPr algn="ctr"/>
+            <a:endParaRPr lang="en-CA"/>
+          </a:p>
+        </p:txBody>
+      </p:sp>
+      <p:sp>
+        <p:nvSpPr>
+          <p:cNvPr id="16" name="Rectangle 15"/>
+          <p:cNvSpPr/>
+          <p:nvPr/>
+        </p:nvSpPr>
+        <p:spPr>
+          <a:xfrm>
+            <a:off x="3201987" y="4340593"/>
+            <a:ext cx="238125" cy="152400"/>
+          </a:xfrm>
+          <a:prstGeom prst="rect">
+            <a:avLst/>
+          </a:prstGeom>
+        </p:spPr>
+        <p:style>
+          <a:lnRef idx="2">
+            <a:schemeClr val="accent1">
+              <a:shade val="50000"/>
+            </a:schemeClr>
+          </a:lnRef>
+          <a:fillRef idx="1">
+            <a:schemeClr val="accent1"/>
+          </a:fillRef>
+          <a:effectRef idx="0">
+            <a:schemeClr val="accent1"/>
+          </a:effectRef>
+          <a:fontRef idx="minor">
+            <a:schemeClr val="lt1"/>
+          </a:fontRef>
+        </p:style>
+        <p:txBody>
+          <a:bodyPr rtlCol="0" anchor="ctr"/>
+          <a:lstStyle/>
+          <a:p>
+            <a:pPr algn="ctr"/>
+            <a:endParaRPr lang="en-CA"/>
+          </a:p>
+        </p:txBody>
+      </p:sp>
+      <p:sp>
+        <p:nvSpPr>
+          <p:cNvPr id="17" name="Rectangle 16"/>
+          <p:cNvSpPr/>
+          <p:nvPr/>
+        </p:nvSpPr>
+        <p:spPr>
+          <a:xfrm>
+            <a:off x="3330524" y="4518597"/>
+            <a:ext cx="195417" cy="191099"/>
+          </a:xfrm>
+          <a:prstGeom prst="rect">
+            <a:avLst/>
+          </a:prstGeom>
+        </p:spPr>
+        <p:style>
+          <a:lnRef idx="2">
+            <a:schemeClr val="accent1">
+              <a:shade val="50000"/>
+            </a:schemeClr>
+          </a:lnRef>
+          <a:fillRef idx="1">
+            <a:schemeClr val="accent1"/>
+          </a:fillRef>
+          <a:effectRef idx="0">
+            <a:schemeClr val="accent1"/>
+          </a:effectRef>
+          <a:fontRef idx="minor">
+            <a:schemeClr val="lt1"/>
+          </a:fontRef>
+        </p:style>
+        <p:txBody>
+          <a:bodyPr rtlCol="0" anchor="ctr"/>
+          <a:lstStyle/>
+          <a:p>
+            <a:pPr algn="ctr"/>
+            <a:endParaRPr lang="en-CA"/>
+          </a:p>
+        </p:txBody>
+      </p:sp>
+      <p:sp>
+        <p:nvSpPr>
+          <p:cNvPr id="19" name="TextBox 18"/>
           <p:cNvSpPr txBox="1"/>
           <p:nvPr/>
         </p:nvSpPr>
         <p:spPr>
           <a:xfrm>
-            <a:off x="1833561" y="3152180"/>
+            <a:off x="2930317" y="3738147"/>
+            <a:ext cx="338554" cy="1247774"/>
+          </a:xfrm>
+          <a:prstGeom prst="rect">
+            <a:avLst/>
+          </a:prstGeom>
+          <a:noFill/>
+        </p:spPr>
+        <p:txBody>
+          <a:bodyPr vert="eaVert" wrap="square" rtlCol="0">
+            <a:spAutoFit/>
+          </a:bodyPr>
+          <a:lstStyle/>
+          <a:p>
+            <a:r>
+              <a:rPr lang="en-CA" sz="1000" dirty="0"/>
+              <a:t>passageway</a:t>
+            </a:r>
+          </a:p>
+        </p:txBody>
+      </p:sp>
+      <p:sp>
+        <p:nvSpPr>
+          <p:cNvPr id="20" name="Rectangle 19"/>
+          <p:cNvSpPr/>
+          <p:nvPr/>
+        </p:nvSpPr>
+        <p:spPr>
+          <a:xfrm>
+            <a:off x="3730729" y="3600628"/>
+            <a:ext cx="342900" cy="226636"/>
+          </a:xfrm>
+          <a:prstGeom prst="rect">
+            <a:avLst/>
+          </a:prstGeom>
+        </p:spPr>
+        <p:style>
+          <a:lnRef idx="2">
+            <a:schemeClr val="accent1">
+              <a:shade val="50000"/>
+            </a:schemeClr>
+          </a:lnRef>
+          <a:fillRef idx="1">
+            <a:schemeClr val="accent1"/>
+          </a:fillRef>
+          <a:effectRef idx="0">
+            <a:schemeClr val="accent1"/>
+          </a:effectRef>
+          <a:fontRef idx="minor">
+            <a:schemeClr val="lt1"/>
+          </a:fontRef>
+        </p:style>
+        <p:txBody>
+          <a:bodyPr rtlCol="0" anchor="ctr"/>
+          <a:lstStyle/>
+          <a:p>
+            <a:pPr algn="ctr"/>
+            <a:endParaRPr lang="en-CA"/>
+          </a:p>
+        </p:txBody>
+      </p:sp>
+      <p:sp>
+        <p:nvSpPr>
+          <p:cNvPr id="21" name="Rectangle 20"/>
+          <p:cNvSpPr/>
+          <p:nvPr/>
+        </p:nvSpPr>
+        <p:spPr>
+          <a:xfrm>
+            <a:off x="3730729" y="3843516"/>
+            <a:ext cx="342900" cy="226636"/>
+          </a:xfrm>
+          <a:prstGeom prst="rect">
+            <a:avLst/>
+          </a:prstGeom>
+        </p:spPr>
+        <p:style>
+          <a:lnRef idx="2">
+            <a:schemeClr val="accent1">
+              <a:shade val="50000"/>
+            </a:schemeClr>
+          </a:lnRef>
+          <a:fillRef idx="1">
+            <a:schemeClr val="accent1"/>
+          </a:fillRef>
+          <a:effectRef idx="0">
+            <a:schemeClr val="accent1"/>
+          </a:effectRef>
+          <a:fontRef idx="minor">
+            <a:schemeClr val="lt1"/>
+          </a:fontRef>
+        </p:style>
+        <p:txBody>
+          <a:bodyPr rtlCol="0" anchor="ctr"/>
+          <a:lstStyle/>
+          <a:p>
+            <a:pPr algn="ctr"/>
+            <a:endParaRPr lang="en-CA"/>
+          </a:p>
+        </p:txBody>
+      </p:sp>
+      <p:sp>
+        <p:nvSpPr>
+          <p:cNvPr id="22" name="Rectangle 21"/>
+          <p:cNvSpPr/>
+          <p:nvPr/>
+        </p:nvSpPr>
+        <p:spPr>
+          <a:xfrm>
+            <a:off x="3730729" y="4086404"/>
+            <a:ext cx="342900" cy="226636"/>
+          </a:xfrm>
+          <a:prstGeom prst="rect">
+            <a:avLst/>
+          </a:prstGeom>
+        </p:spPr>
+        <p:style>
+          <a:lnRef idx="2">
+            <a:schemeClr val="accent1">
+              <a:shade val="50000"/>
+            </a:schemeClr>
+          </a:lnRef>
+          <a:fillRef idx="1">
+            <a:schemeClr val="accent1"/>
+          </a:fillRef>
+          <a:effectRef idx="0">
+            <a:schemeClr val="accent1"/>
+          </a:effectRef>
+          <a:fontRef idx="minor">
+            <a:schemeClr val="lt1"/>
+          </a:fontRef>
+        </p:style>
+        <p:txBody>
+          <a:bodyPr rot="0" spcFirstLastPara="0" vert="horz" wrap="square" lIns="91440" tIns="45720" rIns="91440" bIns="45720" numCol="1" spcCol="0" rtlCol="0" fromWordArt="0" anchor="ctr" anchorCtr="0" forceAA="0" compatLnSpc="1">
+            <a:prstTxWarp prst="textNoShape">
+              <a:avLst/>
+            </a:prstTxWarp>
+            <a:noAutofit/>
+          </a:bodyPr>
+          <a:lstStyle>
+            <a:defPPr>
+              <a:defRPr lang="en-US"/>
+            </a:defPPr>
+            <a:lvl1pPr marL="0" algn="l" defTabSz="914400" rtl="0" eaLnBrk="1" latinLnBrk="0" hangingPunct="1">
+              <a:defRPr sz="1800" kern="1200">
+                <a:solidFill>
+                  <a:schemeClr val="lt1"/>
+                </a:solidFill>
+                <a:latin typeface="+mn-lt"/>
+                <a:ea typeface="+mn-ea"/>
+                <a:cs typeface="+mn-cs"/>
+              </a:defRPr>
+            </a:lvl1pPr>
+            <a:lvl2pPr marL="457200" algn="l" defTabSz="914400" rtl="0" eaLnBrk="1" latinLnBrk="0" hangingPunct="1">
+              <a:defRPr sz="1800" kern="1200">
+                <a:solidFill>
+                  <a:schemeClr val="lt1"/>
+                </a:solidFill>
+                <a:latin typeface="+mn-lt"/>
+                <a:ea typeface="+mn-ea"/>
+                <a:cs typeface="+mn-cs"/>
+              </a:defRPr>
+            </a:lvl2pPr>
+            <a:lvl3pPr marL="914400" algn="l" defTabSz="914400" rtl="0" eaLnBrk="1" latinLnBrk="0" hangingPunct="1">
+              <a:defRPr sz="1800" kern="1200">
+                <a:solidFill>
+                  <a:schemeClr val="lt1"/>
+                </a:solidFill>
+                <a:latin typeface="+mn-lt"/>
+                <a:ea typeface="+mn-ea"/>
+                <a:cs typeface="+mn-cs"/>
+              </a:defRPr>
+            </a:lvl3pPr>
+            <a:lvl4pPr marL="1371600" algn="l" defTabSz="914400" rtl="0" eaLnBrk="1" latinLnBrk="0" hangingPunct="1">
+              <a:defRPr sz="1800" kern="1200">
+                <a:solidFill>
+                  <a:schemeClr val="lt1"/>
+                </a:solidFill>
+                <a:latin typeface="+mn-lt"/>
+                <a:ea typeface="+mn-ea"/>
+                <a:cs typeface="+mn-cs"/>
+              </a:defRPr>
+            </a:lvl4pPr>
+            <a:lvl5pPr marL="1828800" algn="l" defTabSz="914400" rtl="0" eaLnBrk="1" latinLnBrk="0" hangingPunct="1">
+              <a:defRPr sz="1800" kern="1200">
+                <a:solidFill>
+                  <a:schemeClr val="lt1"/>
+                </a:solidFill>
+                <a:latin typeface="+mn-lt"/>
+                <a:ea typeface="+mn-ea"/>
+                <a:cs typeface="+mn-cs"/>
+              </a:defRPr>
+            </a:lvl5pPr>
+            <a:lvl6pPr marL="2286000" algn="l" defTabSz="914400" rtl="0" eaLnBrk="1" latinLnBrk="0" hangingPunct="1">
+              <a:defRPr sz="1800" kern="1200">
+                <a:solidFill>
+                  <a:schemeClr val="lt1"/>
+                </a:solidFill>
+                <a:latin typeface="+mn-lt"/>
+                <a:ea typeface="+mn-ea"/>
+                <a:cs typeface="+mn-cs"/>
+              </a:defRPr>
+            </a:lvl6pPr>
+            <a:lvl7pPr marL="2743200" algn="l" defTabSz="914400" rtl="0" eaLnBrk="1" latinLnBrk="0" hangingPunct="1">
+              <a:defRPr sz="1800" kern="1200">
+                <a:solidFill>
+                  <a:schemeClr val="lt1"/>
+                </a:solidFill>
+                <a:latin typeface="+mn-lt"/>
+                <a:ea typeface="+mn-ea"/>
+                <a:cs typeface="+mn-cs"/>
+              </a:defRPr>
+            </a:lvl7pPr>
+            <a:lvl8pPr marL="3200400" algn="l" defTabSz="914400" rtl="0" eaLnBrk="1" latinLnBrk="0" hangingPunct="1">
+              <a:defRPr sz="1800" kern="1200">
+                <a:solidFill>
+                  <a:schemeClr val="lt1"/>
+                </a:solidFill>
+                <a:latin typeface="+mn-lt"/>
+                <a:ea typeface="+mn-ea"/>
+                <a:cs typeface="+mn-cs"/>
+              </a:defRPr>
+            </a:lvl8pPr>
+            <a:lvl9pPr marL="3657600" algn="l" defTabSz="914400" rtl="0" eaLnBrk="1" latinLnBrk="0" hangingPunct="1">
+              <a:defRPr sz="1800" kern="1200">
+                <a:solidFill>
+                  <a:schemeClr val="lt1"/>
+                </a:solidFill>
+                <a:latin typeface="+mn-lt"/>
+                <a:ea typeface="+mn-ea"/>
+                <a:cs typeface="+mn-cs"/>
+              </a:defRPr>
+            </a:lvl9pPr>
+          </a:lstStyle>
+          <a:p>
+            <a:pPr algn="ctr"/>
+            <a:endParaRPr lang="en-CA"/>
+          </a:p>
+        </p:txBody>
+      </p:sp>
+      <p:sp>
+        <p:nvSpPr>
+          <p:cNvPr id="23" name="Rectangle 22"/>
+          <p:cNvSpPr/>
+          <p:nvPr/>
+        </p:nvSpPr>
+        <p:spPr>
+          <a:xfrm>
+            <a:off x="3730729" y="4340550"/>
+            <a:ext cx="313702" cy="152400"/>
+          </a:xfrm>
+          <a:prstGeom prst="rect">
+            <a:avLst/>
+          </a:prstGeom>
+        </p:spPr>
+        <p:style>
+          <a:lnRef idx="2">
+            <a:schemeClr val="accent1">
+              <a:shade val="50000"/>
+            </a:schemeClr>
+          </a:lnRef>
+          <a:fillRef idx="1">
+            <a:schemeClr val="accent1"/>
+          </a:fillRef>
+          <a:effectRef idx="0">
+            <a:schemeClr val="accent1"/>
+          </a:effectRef>
+          <a:fontRef idx="minor">
+            <a:schemeClr val="lt1"/>
+          </a:fontRef>
+        </p:style>
+        <p:txBody>
+          <a:bodyPr rtlCol="0" anchor="ctr"/>
+          <a:lstStyle/>
+          <a:p>
+            <a:pPr algn="ctr"/>
+            <a:endParaRPr lang="en-CA"/>
+          </a:p>
+        </p:txBody>
+      </p:sp>
+      <p:sp>
+        <p:nvSpPr>
+          <p:cNvPr id="24" name="Rectangle 23"/>
+          <p:cNvSpPr/>
+          <p:nvPr/>
+        </p:nvSpPr>
+        <p:spPr>
+          <a:xfrm>
+            <a:off x="3730524" y="4517600"/>
+            <a:ext cx="342900" cy="172642"/>
+          </a:xfrm>
+          <a:prstGeom prst="rect">
+            <a:avLst/>
+          </a:prstGeom>
+        </p:spPr>
+        <p:style>
+          <a:lnRef idx="2">
+            <a:schemeClr val="accent1">
+              <a:shade val="50000"/>
+            </a:schemeClr>
+          </a:lnRef>
+          <a:fillRef idx="1">
+            <a:schemeClr val="accent1"/>
+          </a:fillRef>
+          <a:effectRef idx="0">
+            <a:schemeClr val="accent1"/>
+          </a:effectRef>
+          <a:fontRef idx="minor">
+            <a:schemeClr val="lt1"/>
+          </a:fontRef>
+        </p:style>
+        <p:txBody>
+          <a:bodyPr rtlCol="0" anchor="ctr"/>
+          <a:lstStyle/>
+          <a:p>
+            <a:pPr algn="ctr"/>
+            <a:endParaRPr lang="en-CA"/>
+          </a:p>
+        </p:txBody>
+      </p:sp>
+      <p:sp>
+        <p:nvSpPr>
+          <p:cNvPr id="25" name="TextBox 24"/>
+          <p:cNvSpPr txBox="1"/>
+          <p:nvPr/>
+        </p:nvSpPr>
+        <p:spPr>
+          <a:xfrm>
+            <a:off x="3501766" y="3743504"/>
+            <a:ext cx="338554" cy="1247774"/>
+          </a:xfrm>
+          <a:prstGeom prst="rect">
+            <a:avLst/>
+          </a:prstGeom>
+          <a:noFill/>
+        </p:spPr>
+        <p:txBody>
+          <a:bodyPr vert="eaVert" wrap="square" rtlCol="0">
+            <a:spAutoFit/>
+          </a:bodyPr>
+          <a:lstStyle/>
+          <a:p>
+            <a:r>
+              <a:rPr lang="en-CA" sz="1000" dirty="0"/>
+              <a:t>passageway</a:t>
+            </a:r>
+          </a:p>
+        </p:txBody>
+      </p:sp>
+      <p:sp>
+        <p:nvSpPr>
+          <p:cNvPr id="26" name="Rectangle 25"/>
+          <p:cNvSpPr/>
+          <p:nvPr/>
+        </p:nvSpPr>
+        <p:spPr>
+          <a:xfrm>
+            <a:off x="2636837" y="5043706"/>
+            <a:ext cx="342900" cy="226636"/>
+          </a:xfrm>
+          <a:prstGeom prst="rect">
+            <a:avLst/>
+          </a:prstGeom>
+        </p:spPr>
+        <p:style>
+          <a:lnRef idx="2">
+            <a:schemeClr val="accent2">
+              <a:shade val="50000"/>
+            </a:schemeClr>
+          </a:lnRef>
+          <a:fillRef idx="1">
+            <a:schemeClr val="accent2"/>
+          </a:fillRef>
+          <a:effectRef idx="0">
+            <a:schemeClr val="accent2"/>
+          </a:effectRef>
+          <a:fontRef idx="minor">
+            <a:schemeClr val="lt1"/>
+          </a:fontRef>
+        </p:style>
+        <p:txBody>
+          <a:bodyPr rtlCol="0" anchor="ctr"/>
+          <a:lstStyle/>
+          <a:p>
+            <a:pPr algn="ctr"/>
+            <a:endParaRPr lang="en-CA"/>
+          </a:p>
+        </p:txBody>
+      </p:sp>
+      <p:sp>
+        <p:nvSpPr>
+          <p:cNvPr id="27" name="Rectangle 26"/>
+          <p:cNvSpPr/>
+          <p:nvPr/>
+        </p:nvSpPr>
+        <p:spPr>
+          <a:xfrm>
+            <a:off x="2635250" y="5305024"/>
+            <a:ext cx="342900" cy="226636"/>
+          </a:xfrm>
+          <a:prstGeom prst="rect">
+            <a:avLst/>
+          </a:prstGeom>
+        </p:spPr>
+        <p:style>
+          <a:lnRef idx="2">
+            <a:schemeClr val="accent1">
+              <a:shade val="50000"/>
+            </a:schemeClr>
+          </a:lnRef>
+          <a:fillRef idx="1">
+            <a:schemeClr val="accent1"/>
+          </a:fillRef>
+          <a:effectRef idx="0">
+            <a:schemeClr val="accent1"/>
+          </a:effectRef>
+          <a:fontRef idx="minor">
+            <a:schemeClr val="lt1"/>
+          </a:fontRef>
+        </p:style>
+        <p:txBody>
+          <a:bodyPr rtlCol="0" anchor="ctr"/>
+          <a:lstStyle/>
+          <a:p>
+            <a:pPr algn="ctr"/>
+            <a:endParaRPr lang="en-CA"/>
+          </a:p>
+        </p:txBody>
+      </p:sp>
+      <p:sp>
+        <p:nvSpPr>
+          <p:cNvPr id="28" name="Rectangle 27"/>
+          <p:cNvSpPr/>
+          <p:nvPr/>
+        </p:nvSpPr>
+        <p:spPr>
+          <a:xfrm>
+            <a:off x="2634455" y="5564553"/>
+            <a:ext cx="342900" cy="226636"/>
+          </a:xfrm>
+          <a:prstGeom prst="rect">
+            <a:avLst/>
+          </a:prstGeom>
+        </p:spPr>
+        <p:style>
+          <a:lnRef idx="2">
+            <a:schemeClr val="accent1">
+              <a:shade val="50000"/>
+            </a:schemeClr>
+          </a:lnRef>
+          <a:fillRef idx="1">
+            <a:schemeClr val="accent1"/>
+          </a:fillRef>
+          <a:effectRef idx="0">
+            <a:schemeClr val="accent1"/>
+          </a:effectRef>
+          <a:fontRef idx="minor">
+            <a:schemeClr val="lt1"/>
+          </a:fontRef>
+        </p:style>
+        <p:txBody>
+          <a:bodyPr rot="0" spcFirstLastPara="0" vert="horz" wrap="square" lIns="91440" tIns="45720" rIns="91440" bIns="45720" numCol="1" spcCol="0" rtlCol="0" fromWordArt="0" anchor="ctr" anchorCtr="0" forceAA="0" compatLnSpc="1">
+            <a:prstTxWarp prst="textNoShape">
+              <a:avLst/>
+            </a:prstTxWarp>
+            <a:noAutofit/>
+          </a:bodyPr>
+          <a:lstStyle>
+            <a:defPPr>
+              <a:defRPr lang="en-US"/>
+            </a:defPPr>
+            <a:lvl1pPr marL="0" algn="l" defTabSz="914400" rtl="0" eaLnBrk="1" latinLnBrk="0" hangingPunct="1">
+              <a:defRPr sz="1800" kern="1200">
+                <a:solidFill>
+                  <a:schemeClr val="lt1"/>
+                </a:solidFill>
+                <a:latin typeface="+mn-lt"/>
+                <a:ea typeface="+mn-ea"/>
+                <a:cs typeface="+mn-cs"/>
+              </a:defRPr>
+            </a:lvl1pPr>
+            <a:lvl2pPr marL="457200" algn="l" defTabSz="914400" rtl="0" eaLnBrk="1" latinLnBrk="0" hangingPunct="1">
+              <a:defRPr sz="1800" kern="1200">
+                <a:solidFill>
+                  <a:schemeClr val="lt1"/>
+                </a:solidFill>
+                <a:latin typeface="+mn-lt"/>
+                <a:ea typeface="+mn-ea"/>
+                <a:cs typeface="+mn-cs"/>
+              </a:defRPr>
+            </a:lvl2pPr>
+            <a:lvl3pPr marL="914400" algn="l" defTabSz="914400" rtl="0" eaLnBrk="1" latinLnBrk="0" hangingPunct="1">
+              <a:defRPr sz="1800" kern="1200">
+                <a:solidFill>
+                  <a:schemeClr val="lt1"/>
+                </a:solidFill>
+                <a:latin typeface="+mn-lt"/>
+                <a:ea typeface="+mn-ea"/>
+                <a:cs typeface="+mn-cs"/>
+              </a:defRPr>
+            </a:lvl3pPr>
+            <a:lvl4pPr marL="1371600" algn="l" defTabSz="914400" rtl="0" eaLnBrk="1" latinLnBrk="0" hangingPunct="1">
+              <a:defRPr sz="1800" kern="1200">
+                <a:solidFill>
+                  <a:schemeClr val="lt1"/>
+                </a:solidFill>
+                <a:latin typeface="+mn-lt"/>
+                <a:ea typeface="+mn-ea"/>
+                <a:cs typeface="+mn-cs"/>
+              </a:defRPr>
+            </a:lvl4pPr>
+            <a:lvl5pPr marL="1828800" algn="l" defTabSz="914400" rtl="0" eaLnBrk="1" latinLnBrk="0" hangingPunct="1">
+              <a:defRPr sz="1800" kern="1200">
+                <a:solidFill>
+                  <a:schemeClr val="lt1"/>
+                </a:solidFill>
+                <a:latin typeface="+mn-lt"/>
+                <a:ea typeface="+mn-ea"/>
+                <a:cs typeface="+mn-cs"/>
+              </a:defRPr>
+            </a:lvl5pPr>
+            <a:lvl6pPr marL="2286000" algn="l" defTabSz="914400" rtl="0" eaLnBrk="1" latinLnBrk="0" hangingPunct="1">
+              <a:defRPr sz="1800" kern="1200">
+                <a:solidFill>
+                  <a:schemeClr val="lt1"/>
+                </a:solidFill>
+                <a:latin typeface="+mn-lt"/>
+                <a:ea typeface="+mn-ea"/>
+                <a:cs typeface="+mn-cs"/>
+              </a:defRPr>
+            </a:lvl6pPr>
+            <a:lvl7pPr marL="2743200" algn="l" defTabSz="914400" rtl="0" eaLnBrk="1" latinLnBrk="0" hangingPunct="1">
+              <a:defRPr sz="1800" kern="1200">
+                <a:solidFill>
+                  <a:schemeClr val="lt1"/>
+                </a:solidFill>
+                <a:latin typeface="+mn-lt"/>
+                <a:ea typeface="+mn-ea"/>
+                <a:cs typeface="+mn-cs"/>
+              </a:defRPr>
+            </a:lvl7pPr>
+            <a:lvl8pPr marL="3200400" algn="l" defTabSz="914400" rtl="0" eaLnBrk="1" latinLnBrk="0" hangingPunct="1">
+              <a:defRPr sz="1800" kern="1200">
+                <a:solidFill>
+                  <a:schemeClr val="lt1"/>
+                </a:solidFill>
+                <a:latin typeface="+mn-lt"/>
+                <a:ea typeface="+mn-ea"/>
+                <a:cs typeface="+mn-cs"/>
+              </a:defRPr>
+            </a:lvl8pPr>
+            <a:lvl9pPr marL="3657600" algn="l" defTabSz="914400" rtl="0" eaLnBrk="1" latinLnBrk="0" hangingPunct="1">
+              <a:defRPr sz="1800" kern="1200">
+                <a:solidFill>
+                  <a:schemeClr val="lt1"/>
+                </a:solidFill>
+                <a:latin typeface="+mn-lt"/>
+                <a:ea typeface="+mn-ea"/>
+                <a:cs typeface="+mn-cs"/>
+              </a:defRPr>
+            </a:lvl9pPr>
+          </a:lstStyle>
+          <a:p>
+            <a:pPr algn="ctr"/>
+            <a:endParaRPr lang="en-CA"/>
+          </a:p>
+        </p:txBody>
+      </p:sp>
+      <p:sp>
+        <p:nvSpPr>
+          <p:cNvPr id="29" name="Rectangle 28"/>
+          <p:cNvSpPr/>
+          <p:nvPr/>
+        </p:nvSpPr>
+        <p:spPr>
+          <a:xfrm>
+            <a:off x="2635250" y="5810573"/>
+            <a:ext cx="238125" cy="152400"/>
+          </a:xfrm>
+          <a:prstGeom prst="rect">
+            <a:avLst/>
+          </a:prstGeom>
+        </p:spPr>
+        <p:style>
+          <a:lnRef idx="2">
+            <a:schemeClr val="accent1">
+              <a:shade val="50000"/>
+            </a:schemeClr>
+          </a:lnRef>
+          <a:fillRef idx="1">
+            <a:schemeClr val="accent1"/>
+          </a:fillRef>
+          <a:effectRef idx="0">
+            <a:schemeClr val="accent1"/>
+          </a:effectRef>
+          <a:fontRef idx="minor">
+            <a:schemeClr val="lt1"/>
+          </a:fontRef>
+        </p:style>
+        <p:txBody>
+          <a:bodyPr rtlCol="0" anchor="ctr"/>
+          <a:lstStyle/>
+          <a:p>
+            <a:pPr algn="ctr"/>
+            <a:endParaRPr lang="en-CA"/>
+          </a:p>
+        </p:txBody>
+      </p:sp>
+      <p:sp>
+        <p:nvSpPr>
+          <p:cNvPr id="30" name="Rectangle 29"/>
+          <p:cNvSpPr/>
+          <p:nvPr/>
+        </p:nvSpPr>
+        <p:spPr>
+          <a:xfrm>
+            <a:off x="2634455" y="5980585"/>
+            <a:ext cx="128588" cy="95249"/>
+          </a:xfrm>
+          <a:prstGeom prst="rect">
+            <a:avLst/>
+          </a:prstGeom>
+        </p:spPr>
+        <p:style>
+          <a:lnRef idx="2">
+            <a:schemeClr val="accent1">
+              <a:shade val="50000"/>
+            </a:schemeClr>
+          </a:lnRef>
+          <a:fillRef idx="1">
+            <a:schemeClr val="accent1"/>
+          </a:fillRef>
+          <a:effectRef idx="0">
+            <a:schemeClr val="accent1"/>
+          </a:effectRef>
+          <a:fontRef idx="minor">
+            <a:schemeClr val="lt1"/>
+          </a:fontRef>
+        </p:style>
+        <p:txBody>
+          <a:bodyPr rtlCol="0" anchor="ctr"/>
+          <a:lstStyle/>
+          <a:p>
+            <a:pPr algn="ctr"/>
+            <a:endParaRPr lang="en-CA"/>
+          </a:p>
+        </p:txBody>
+      </p:sp>
+      <p:sp>
+        <p:nvSpPr>
+          <p:cNvPr id="31" name="Rectangle 30"/>
+          <p:cNvSpPr/>
+          <p:nvPr/>
+        </p:nvSpPr>
+        <p:spPr>
+          <a:xfrm>
+            <a:off x="2782785" y="5980585"/>
+            <a:ext cx="171450" cy="172642"/>
+          </a:xfrm>
+          <a:prstGeom prst="rect">
+            <a:avLst/>
+          </a:prstGeom>
+        </p:spPr>
+        <p:style>
+          <a:lnRef idx="2">
+            <a:schemeClr val="accent1">
+              <a:shade val="50000"/>
+            </a:schemeClr>
+          </a:lnRef>
+          <a:fillRef idx="1">
+            <a:schemeClr val="accent1"/>
+          </a:fillRef>
+          <a:effectRef idx="0">
+            <a:schemeClr val="accent1"/>
+          </a:effectRef>
+          <a:fontRef idx="minor">
+            <a:schemeClr val="lt1"/>
+          </a:fontRef>
+        </p:style>
+        <p:txBody>
+          <a:bodyPr rtlCol="0" anchor="ctr"/>
+          <a:lstStyle/>
+          <a:p>
+            <a:pPr algn="ctr"/>
+            <a:endParaRPr lang="en-CA"/>
+          </a:p>
+        </p:txBody>
+      </p:sp>
+      <p:sp>
+        <p:nvSpPr>
+          <p:cNvPr id="32" name="Rectangle 31"/>
+          <p:cNvSpPr/>
+          <p:nvPr/>
+        </p:nvSpPr>
+        <p:spPr>
+          <a:xfrm>
+            <a:off x="3182937" y="5044566"/>
+            <a:ext cx="342900" cy="226636"/>
+          </a:xfrm>
+          <a:prstGeom prst="rect">
+            <a:avLst/>
+          </a:prstGeom>
+        </p:spPr>
+        <p:style>
+          <a:lnRef idx="2">
+            <a:schemeClr val="accent1">
+              <a:shade val="50000"/>
+            </a:schemeClr>
+          </a:lnRef>
+          <a:fillRef idx="1">
+            <a:schemeClr val="accent1"/>
+          </a:fillRef>
+          <a:effectRef idx="0">
+            <a:schemeClr val="accent1"/>
+          </a:effectRef>
+          <a:fontRef idx="minor">
+            <a:schemeClr val="lt1"/>
+          </a:fontRef>
+        </p:style>
+        <p:txBody>
+          <a:bodyPr rtlCol="0" anchor="ctr"/>
+          <a:lstStyle/>
+          <a:p>
+            <a:pPr algn="ctr"/>
+            <a:endParaRPr lang="en-CA"/>
+          </a:p>
+        </p:txBody>
+      </p:sp>
+      <p:sp>
+        <p:nvSpPr>
+          <p:cNvPr id="33" name="Rectangle 32"/>
+          <p:cNvSpPr/>
+          <p:nvPr/>
+        </p:nvSpPr>
+        <p:spPr>
+          <a:xfrm>
+            <a:off x="3182937" y="5301435"/>
+            <a:ext cx="342900" cy="226636"/>
+          </a:xfrm>
+          <a:prstGeom prst="rect">
+            <a:avLst/>
+          </a:prstGeom>
+        </p:spPr>
+        <p:style>
+          <a:lnRef idx="2">
+            <a:schemeClr val="accent1">
+              <a:shade val="50000"/>
+            </a:schemeClr>
+          </a:lnRef>
+          <a:fillRef idx="1">
+            <a:schemeClr val="accent1"/>
+          </a:fillRef>
+          <a:effectRef idx="0">
+            <a:schemeClr val="accent1"/>
+          </a:effectRef>
+          <a:fontRef idx="minor">
+            <a:schemeClr val="lt1"/>
+          </a:fontRef>
+        </p:style>
+        <p:txBody>
+          <a:bodyPr rtlCol="0" anchor="ctr"/>
+          <a:lstStyle/>
+          <a:p>
+            <a:pPr algn="ctr"/>
+            <a:endParaRPr lang="en-CA"/>
+          </a:p>
+        </p:txBody>
+      </p:sp>
+      <p:sp>
+        <p:nvSpPr>
+          <p:cNvPr id="34" name="Rectangle 33"/>
+          <p:cNvSpPr/>
+          <p:nvPr/>
+        </p:nvSpPr>
+        <p:spPr>
+          <a:xfrm>
+            <a:off x="3182937" y="5558579"/>
+            <a:ext cx="342900" cy="226636"/>
+          </a:xfrm>
+          <a:prstGeom prst="rect">
+            <a:avLst/>
+          </a:prstGeom>
+        </p:spPr>
+        <p:style>
+          <a:lnRef idx="2">
+            <a:schemeClr val="accent1">
+              <a:shade val="50000"/>
+            </a:schemeClr>
+          </a:lnRef>
+          <a:fillRef idx="1">
+            <a:schemeClr val="accent1"/>
+          </a:fillRef>
+          <a:effectRef idx="0">
+            <a:schemeClr val="accent1"/>
+          </a:effectRef>
+          <a:fontRef idx="minor">
+            <a:schemeClr val="lt1"/>
+          </a:fontRef>
+        </p:style>
+        <p:txBody>
+          <a:bodyPr rot="0" spcFirstLastPara="0" vert="horz" wrap="square" lIns="91440" tIns="45720" rIns="91440" bIns="45720" numCol="1" spcCol="0" rtlCol="0" fromWordArt="0" anchor="ctr" anchorCtr="0" forceAA="0" compatLnSpc="1">
+            <a:prstTxWarp prst="textNoShape">
+              <a:avLst/>
+            </a:prstTxWarp>
+            <a:noAutofit/>
+          </a:bodyPr>
+          <a:lstStyle>
+            <a:defPPr>
+              <a:defRPr lang="en-US"/>
+            </a:defPPr>
+            <a:lvl1pPr marL="0" algn="l" defTabSz="914400" rtl="0" eaLnBrk="1" latinLnBrk="0" hangingPunct="1">
+              <a:defRPr sz="1800" kern="1200">
+                <a:solidFill>
+                  <a:schemeClr val="lt1"/>
+                </a:solidFill>
+                <a:latin typeface="+mn-lt"/>
+                <a:ea typeface="+mn-ea"/>
+                <a:cs typeface="+mn-cs"/>
+              </a:defRPr>
+            </a:lvl1pPr>
+            <a:lvl2pPr marL="457200" algn="l" defTabSz="914400" rtl="0" eaLnBrk="1" latinLnBrk="0" hangingPunct="1">
+              <a:defRPr sz="1800" kern="1200">
+                <a:solidFill>
+                  <a:schemeClr val="lt1"/>
+                </a:solidFill>
+                <a:latin typeface="+mn-lt"/>
+                <a:ea typeface="+mn-ea"/>
+                <a:cs typeface="+mn-cs"/>
+              </a:defRPr>
+            </a:lvl2pPr>
+            <a:lvl3pPr marL="914400" algn="l" defTabSz="914400" rtl="0" eaLnBrk="1" latinLnBrk="0" hangingPunct="1">
+              <a:defRPr sz="1800" kern="1200">
+                <a:solidFill>
+                  <a:schemeClr val="lt1"/>
+                </a:solidFill>
+                <a:latin typeface="+mn-lt"/>
+                <a:ea typeface="+mn-ea"/>
+                <a:cs typeface="+mn-cs"/>
+              </a:defRPr>
+            </a:lvl3pPr>
+            <a:lvl4pPr marL="1371600" algn="l" defTabSz="914400" rtl="0" eaLnBrk="1" latinLnBrk="0" hangingPunct="1">
+              <a:defRPr sz="1800" kern="1200">
+                <a:solidFill>
+                  <a:schemeClr val="lt1"/>
+                </a:solidFill>
+                <a:latin typeface="+mn-lt"/>
+                <a:ea typeface="+mn-ea"/>
+                <a:cs typeface="+mn-cs"/>
+              </a:defRPr>
+            </a:lvl4pPr>
+            <a:lvl5pPr marL="1828800" algn="l" defTabSz="914400" rtl="0" eaLnBrk="1" latinLnBrk="0" hangingPunct="1">
+              <a:defRPr sz="1800" kern="1200">
+                <a:solidFill>
+                  <a:schemeClr val="lt1"/>
+                </a:solidFill>
+                <a:latin typeface="+mn-lt"/>
+                <a:ea typeface="+mn-ea"/>
+                <a:cs typeface="+mn-cs"/>
+              </a:defRPr>
+            </a:lvl5pPr>
+            <a:lvl6pPr marL="2286000" algn="l" defTabSz="914400" rtl="0" eaLnBrk="1" latinLnBrk="0" hangingPunct="1">
+              <a:defRPr sz="1800" kern="1200">
+                <a:solidFill>
+                  <a:schemeClr val="lt1"/>
+                </a:solidFill>
+                <a:latin typeface="+mn-lt"/>
+                <a:ea typeface="+mn-ea"/>
+                <a:cs typeface="+mn-cs"/>
+              </a:defRPr>
+            </a:lvl6pPr>
+            <a:lvl7pPr marL="2743200" algn="l" defTabSz="914400" rtl="0" eaLnBrk="1" latinLnBrk="0" hangingPunct="1">
+              <a:defRPr sz="1800" kern="1200">
+                <a:solidFill>
+                  <a:schemeClr val="lt1"/>
+                </a:solidFill>
+                <a:latin typeface="+mn-lt"/>
+                <a:ea typeface="+mn-ea"/>
+                <a:cs typeface="+mn-cs"/>
+              </a:defRPr>
+            </a:lvl7pPr>
+            <a:lvl8pPr marL="3200400" algn="l" defTabSz="914400" rtl="0" eaLnBrk="1" latinLnBrk="0" hangingPunct="1">
+              <a:defRPr sz="1800" kern="1200">
+                <a:solidFill>
+                  <a:schemeClr val="lt1"/>
+                </a:solidFill>
+                <a:latin typeface="+mn-lt"/>
+                <a:ea typeface="+mn-ea"/>
+                <a:cs typeface="+mn-cs"/>
+              </a:defRPr>
+            </a:lvl8pPr>
+            <a:lvl9pPr marL="3657600" algn="l" defTabSz="914400" rtl="0" eaLnBrk="1" latinLnBrk="0" hangingPunct="1">
+              <a:defRPr sz="1800" kern="1200">
+                <a:solidFill>
+                  <a:schemeClr val="lt1"/>
+                </a:solidFill>
+                <a:latin typeface="+mn-lt"/>
+                <a:ea typeface="+mn-ea"/>
+                <a:cs typeface="+mn-cs"/>
+              </a:defRPr>
+            </a:lvl9pPr>
+          </a:lstStyle>
+          <a:p>
+            <a:pPr algn="ctr"/>
+            <a:endParaRPr lang="en-CA"/>
+          </a:p>
+        </p:txBody>
+      </p:sp>
+      <p:sp>
+        <p:nvSpPr>
+          <p:cNvPr id="35" name="Rectangle 34"/>
+          <p:cNvSpPr/>
+          <p:nvPr/>
+        </p:nvSpPr>
+        <p:spPr>
+          <a:xfrm>
+            <a:off x="3185924" y="5806700"/>
+            <a:ext cx="238125" cy="152400"/>
+          </a:xfrm>
+          <a:prstGeom prst="rect">
+            <a:avLst/>
+          </a:prstGeom>
+        </p:spPr>
+        <p:style>
+          <a:lnRef idx="2">
+            <a:schemeClr val="accent1">
+              <a:shade val="50000"/>
+            </a:schemeClr>
+          </a:lnRef>
+          <a:fillRef idx="1">
+            <a:schemeClr val="accent1"/>
+          </a:fillRef>
+          <a:effectRef idx="0">
+            <a:schemeClr val="accent1"/>
+          </a:effectRef>
+          <a:fontRef idx="minor">
+            <a:schemeClr val="lt1"/>
+          </a:fontRef>
+        </p:style>
+        <p:txBody>
+          <a:bodyPr rtlCol="0" anchor="ctr"/>
+          <a:lstStyle/>
+          <a:p>
+            <a:pPr algn="ctr"/>
+            <a:endParaRPr lang="en-CA"/>
+          </a:p>
+        </p:txBody>
+      </p:sp>
+      <p:sp>
+        <p:nvSpPr>
+          <p:cNvPr id="36" name="Rectangle 35"/>
+          <p:cNvSpPr/>
+          <p:nvPr/>
+        </p:nvSpPr>
+        <p:spPr>
+          <a:xfrm>
+            <a:off x="3184473" y="5980585"/>
+            <a:ext cx="342900" cy="172642"/>
+          </a:xfrm>
+          <a:prstGeom prst="rect">
+            <a:avLst/>
+          </a:prstGeom>
+        </p:spPr>
+        <p:style>
+          <a:lnRef idx="2">
+            <a:schemeClr val="accent1">
+              <a:shade val="50000"/>
+            </a:schemeClr>
+          </a:lnRef>
+          <a:fillRef idx="1">
+            <a:schemeClr val="accent1"/>
+          </a:fillRef>
+          <a:effectRef idx="0">
+            <a:schemeClr val="accent1"/>
+          </a:effectRef>
+          <a:fontRef idx="minor">
+            <a:schemeClr val="lt1"/>
+          </a:fontRef>
+        </p:style>
+        <p:txBody>
+          <a:bodyPr rtlCol="0" anchor="ctr"/>
+          <a:lstStyle/>
+          <a:p>
+            <a:pPr algn="ctr"/>
+            <a:endParaRPr lang="en-CA"/>
+          </a:p>
+        </p:txBody>
+      </p:sp>
+      <p:sp>
+        <p:nvSpPr>
+          <p:cNvPr id="37" name="Rectangle 36"/>
+          <p:cNvSpPr/>
+          <p:nvPr/>
+        </p:nvSpPr>
+        <p:spPr>
+          <a:xfrm>
+            <a:off x="3711679" y="5067445"/>
+            <a:ext cx="342900" cy="226636"/>
+          </a:xfrm>
+          <a:prstGeom prst="rect">
+            <a:avLst/>
+          </a:prstGeom>
+        </p:spPr>
+        <p:style>
+          <a:lnRef idx="2">
+            <a:schemeClr val="accent1">
+              <a:shade val="50000"/>
+            </a:schemeClr>
+          </a:lnRef>
+          <a:fillRef idx="1">
+            <a:schemeClr val="accent1"/>
+          </a:fillRef>
+          <a:effectRef idx="0">
+            <a:schemeClr val="accent1"/>
+          </a:effectRef>
+          <a:fontRef idx="minor">
+            <a:schemeClr val="lt1"/>
+          </a:fontRef>
+        </p:style>
+        <p:txBody>
+          <a:bodyPr rtlCol="0" anchor="ctr"/>
+          <a:lstStyle/>
+          <a:p>
+            <a:pPr algn="ctr"/>
+            <a:endParaRPr lang="en-CA"/>
+          </a:p>
+        </p:txBody>
+      </p:sp>
+      <p:sp>
+        <p:nvSpPr>
+          <p:cNvPr id="39" name="Rectangle 38"/>
+          <p:cNvSpPr/>
+          <p:nvPr/>
+        </p:nvSpPr>
+        <p:spPr>
+          <a:xfrm>
+            <a:off x="3711679" y="5553221"/>
+            <a:ext cx="342900" cy="226636"/>
+          </a:xfrm>
+          <a:prstGeom prst="rect">
+            <a:avLst/>
+          </a:prstGeom>
+        </p:spPr>
+        <p:style>
+          <a:lnRef idx="2">
+            <a:schemeClr val="accent1">
+              <a:shade val="50000"/>
+            </a:schemeClr>
+          </a:lnRef>
+          <a:fillRef idx="1">
+            <a:schemeClr val="accent1"/>
+          </a:fillRef>
+          <a:effectRef idx="0">
+            <a:schemeClr val="accent1"/>
+          </a:effectRef>
+          <a:fontRef idx="minor">
+            <a:schemeClr val="lt1"/>
+          </a:fontRef>
+        </p:style>
+        <p:txBody>
+          <a:bodyPr rot="0" spcFirstLastPara="0" vert="horz" wrap="square" lIns="91440" tIns="45720" rIns="91440" bIns="45720" numCol="1" spcCol="0" rtlCol="0" fromWordArt="0" anchor="ctr" anchorCtr="0" forceAA="0" compatLnSpc="1">
+            <a:prstTxWarp prst="textNoShape">
+              <a:avLst/>
+            </a:prstTxWarp>
+            <a:noAutofit/>
+          </a:bodyPr>
+          <a:lstStyle>
+            <a:defPPr>
+              <a:defRPr lang="en-US"/>
+            </a:defPPr>
+            <a:lvl1pPr marL="0" algn="l" defTabSz="914400" rtl="0" eaLnBrk="1" latinLnBrk="0" hangingPunct="1">
+              <a:defRPr sz="1800" kern="1200">
+                <a:solidFill>
+                  <a:schemeClr val="lt1"/>
+                </a:solidFill>
+                <a:latin typeface="+mn-lt"/>
+                <a:ea typeface="+mn-ea"/>
+                <a:cs typeface="+mn-cs"/>
+              </a:defRPr>
+            </a:lvl1pPr>
+            <a:lvl2pPr marL="457200" algn="l" defTabSz="914400" rtl="0" eaLnBrk="1" latinLnBrk="0" hangingPunct="1">
+              <a:defRPr sz="1800" kern="1200">
+                <a:solidFill>
+                  <a:schemeClr val="lt1"/>
+                </a:solidFill>
+                <a:latin typeface="+mn-lt"/>
+                <a:ea typeface="+mn-ea"/>
+                <a:cs typeface="+mn-cs"/>
+              </a:defRPr>
+            </a:lvl2pPr>
+            <a:lvl3pPr marL="914400" algn="l" defTabSz="914400" rtl="0" eaLnBrk="1" latinLnBrk="0" hangingPunct="1">
+              <a:defRPr sz="1800" kern="1200">
+                <a:solidFill>
+                  <a:schemeClr val="lt1"/>
+                </a:solidFill>
+                <a:latin typeface="+mn-lt"/>
+                <a:ea typeface="+mn-ea"/>
+                <a:cs typeface="+mn-cs"/>
+              </a:defRPr>
+            </a:lvl3pPr>
+            <a:lvl4pPr marL="1371600" algn="l" defTabSz="914400" rtl="0" eaLnBrk="1" latinLnBrk="0" hangingPunct="1">
+              <a:defRPr sz="1800" kern="1200">
+                <a:solidFill>
+                  <a:schemeClr val="lt1"/>
+                </a:solidFill>
+                <a:latin typeface="+mn-lt"/>
+                <a:ea typeface="+mn-ea"/>
+                <a:cs typeface="+mn-cs"/>
+              </a:defRPr>
+            </a:lvl4pPr>
+            <a:lvl5pPr marL="1828800" algn="l" defTabSz="914400" rtl="0" eaLnBrk="1" latinLnBrk="0" hangingPunct="1">
+              <a:defRPr sz="1800" kern="1200">
+                <a:solidFill>
+                  <a:schemeClr val="lt1"/>
+                </a:solidFill>
+                <a:latin typeface="+mn-lt"/>
+                <a:ea typeface="+mn-ea"/>
+                <a:cs typeface="+mn-cs"/>
+              </a:defRPr>
+            </a:lvl5pPr>
+            <a:lvl6pPr marL="2286000" algn="l" defTabSz="914400" rtl="0" eaLnBrk="1" latinLnBrk="0" hangingPunct="1">
+              <a:defRPr sz="1800" kern="1200">
+                <a:solidFill>
+                  <a:schemeClr val="lt1"/>
+                </a:solidFill>
+                <a:latin typeface="+mn-lt"/>
+                <a:ea typeface="+mn-ea"/>
+                <a:cs typeface="+mn-cs"/>
+              </a:defRPr>
+            </a:lvl6pPr>
+            <a:lvl7pPr marL="2743200" algn="l" defTabSz="914400" rtl="0" eaLnBrk="1" latinLnBrk="0" hangingPunct="1">
+              <a:defRPr sz="1800" kern="1200">
+                <a:solidFill>
+                  <a:schemeClr val="lt1"/>
+                </a:solidFill>
+                <a:latin typeface="+mn-lt"/>
+                <a:ea typeface="+mn-ea"/>
+                <a:cs typeface="+mn-cs"/>
+              </a:defRPr>
+            </a:lvl7pPr>
+            <a:lvl8pPr marL="3200400" algn="l" defTabSz="914400" rtl="0" eaLnBrk="1" latinLnBrk="0" hangingPunct="1">
+              <a:defRPr sz="1800" kern="1200">
+                <a:solidFill>
+                  <a:schemeClr val="lt1"/>
+                </a:solidFill>
+                <a:latin typeface="+mn-lt"/>
+                <a:ea typeface="+mn-ea"/>
+                <a:cs typeface="+mn-cs"/>
+              </a:defRPr>
+            </a:lvl8pPr>
+            <a:lvl9pPr marL="3657600" algn="l" defTabSz="914400" rtl="0" eaLnBrk="1" latinLnBrk="0" hangingPunct="1">
+              <a:defRPr sz="1800" kern="1200">
+                <a:solidFill>
+                  <a:schemeClr val="lt1"/>
+                </a:solidFill>
+                <a:latin typeface="+mn-lt"/>
+                <a:ea typeface="+mn-ea"/>
+                <a:cs typeface="+mn-cs"/>
+              </a:defRPr>
+            </a:lvl9pPr>
+          </a:lstStyle>
+          <a:p>
+            <a:pPr algn="ctr"/>
+            <a:endParaRPr lang="en-CA"/>
+          </a:p>
+        </p:txBody>
+      </p:sp>
+      <p:sp>
+        <p:nvSpPr>
+          <p:cNvPr id="40" name="Rectangle 39"/>
+          <p:cNvSpPr/>
+          <p:nvPr/>
+        </p:nvSpPr>
+        <p:spPr>
+          <a:xfrm>
+            <a:off x="3711679" y="5799293"/>
+            <a:ext cx="238125" cy="152400"/>
+          </a:xfrm>
+          <a:prstGeom prst="rect">
+            <a:avLst/>
+          </a:prstGeom>
+        </p:spPr>
+        <p:style>
+          <a:lnRef idx="2">
+            <a:schemeClr val="accent1">
+              <a:shade val="50000"/>
+            </a:schemeClr>
+          </a:lnRef>
+          <a:fillRef idx="1">
+            <a:schemeClr val="accent1"/>
+          </a:fillRef>
+          <a:effectRef idx="0">
+            <a:schemeClr val="accent1"/>
+          </a:effectRef>
+          <a:fontRef idx="minor">
+            <a:schemeClr val="lt1"/>
+          </a:fontRef>
+        </p:style>
+        <p:txBody>
+          <a:bodyPr rtlCol="0" anchor="ctr"/>
+          <a:lstStyle/>
+          <a:p>
+            <a:pPr algn="ctr"/>
+            <a:endParaRPr lang="en-CA"/>
+          </a:p>
+        </p:txBody>
+      </p:sp>
+      <p:sp>
+        <p:nvSpPr>
+          <p:cNvPr id="41" name="Rectangle 40"/>
+          <p:cNvSpPr/>
+          <p:nvPr/>
+        </p:nvSpPr>
+        <p:spPr>
+          <a:xfrm>
+            <a:off x="3711679" y="5971129"/>
+            <a:ext cx="342900" cy="172642"/>
+          </a:xfrm>
+          <a:prstGeom prst="rect">
+            <a:avLst/>
+          </a:prstGeom>
+        </p:spPr>
+        <p:style>
+          <a:lnRef idx="2">
+            <a:schemeClr val="accent1">
+              <a:shade val="50000"/>
+            </a:schemeClr>
+          </a:lnRef>
+          <a:fillRef idx="1">
+            <a:schemeClr val="accent1"/>
+          </a:fillRef>
+          <a:effectRef idx="0">
+            <a:schemeClr val="accent1"/>
+          </a:effectRef>
+          <a:fontRef idx="minor">
+            <a:schemeClr val="lt1"/>
+          </a:fontRef>
+        </p:style>
+        <p:txBody>
+          <a:bodyPr rtlCol="0" anchor="ctr"/>
+          <a:lstStyle/>
+          <a:p>
+            <a:pPr algn="ctr"/>
+            <a:endParaRPr lang="en-CA"/>
+          </a:p>
+        </p:txBody>
+      </p:sp>
+      <p:sp>
+        <p:nvSpPr>
+          <p:cNvPr id="42" name="TextBox 41"/>
+          <p:cNvSpPr txBox="1"/>
+          <p:nvPr/>
+        </p:nvSpPr>
+        <p:spPr>
+          <a:xfrm>
+            <a:off x="2911163" y="5138078"/>
+            <a:ext cx="338554" cy="1247774"/>
+          </a:xfrm>
+          <a:prstGeom prst="rect">
+            <a:avLst/>
+          </a:prstGeom>
+          <a:noFill/>
+        </p:spPr>
+        <p:txBody>
+          <a:bodyPr vert="eaVert" wrap="square" rtlCol="0">
+            <a:spAutoFit/>
+          </a:bodyPr>
+          <a:lstStyle/>
+          <a:p>
+            <a:r>
+              <a:rPr lang="en-CA" sz="1000" dirty="0"/>
+              <a:t>passageway</a:t>
+            </a:r>
+          </a:p>
+        </p:txBody>
+      </p:sp>
+      <p:sp>
+        <p:nvSpPr>
+          <p:cNvPr id="43" name="TextBox 42"/>
+          <p:cNvSpPr txBox="1"/>
+          <p:nvPr/>
+        </p:nvSpPr>
+        <p:spPr>
+          <a:xfrm>
+            <a:off x="3482872" y="5138848"/>
+            <a:ext cx="338554" cy="1247774"/>
+          </a:xfrm>
+          <a:prstGeom prst="rect">
+            <a:avLst/>
+          </a:prstGeom>
+          <a:noFill/>
+        </p:spPr>
+        <p:txBody>
+          <a:bodyPr vert="eaVert" wrap="square" rtlCol="0">
+            <a:spAutoFit/>
+          </a:bodyPr>
+          <a:lstStyle/>
+          <a:p>
+            <a:r>
+              <a:rPr lang="en-CA" sz="1000" dirty="0"/>
+              <a:t>passageway</a:t>
+            </a:r>
+          </a:p>
+        </p:txBody>
+      </p:sp>
+      <p:sp>
+        <p:nvSpPr>
+          <p:cNvPr id="44" name="Rectangle 43"/>
+          <p:cNvSpPr/>
+          <p:nvPr/>
+        </p:nvSpPr>
+        <p:spPr>
+          <a:xfrm>
+            <a:off x="3201987" y="4518596"/>
+            <a:ext cx="95668" cy="191100"/>
+          </a:xfrm>
+          <a:prstGeom prst="rect">
+            <a:avLst/>
+          </a:prstGeom>
+        </p:spPr>
+        <p:style>
+          <a:lnRef idx="2">
+            <a:schemeClr val="accent1">
+              <a:shade val="50000"/>
+            </a:schemeClr>
+          </a:lnRef>
+          <a:fillRef idx="1">
+            <a:schemeClr val="accent1"/>
+          </a:fillRef>
+          <a:effectRef idx="0">
+            <a:schemeClr val="accent1"/>
+          </a:effectRef>
+          <a:fontRef idx="minor">
+            <a:schemeClr val="lt1"/>
+          </a:fontRef>
+        </p:style>
+        <p:txBody>
+          <a:bodyPr rtlCol="0" anchor="ctr"/>
+          <a:lstStyle/>
+          <a:p>
+            <a:pPr algn="ctr"/>
+            <a:endParaRPr lang="en-CA"/>
+          </a:p>
+        </p:txBody>
+      </p:sp>
+      <p:sp>
+        <p:nvSpPr>
+          <p:cNvPr id="45" name="Rectangle 44"/>
+          <p:cNvSpPr/>
+          <p:nvPr/>
+        </p:nvSpPr>
+        <p:spPr>
+          <a:xfrm>
+            <a:off x="3821270" y="5322771"/>
+            <a:ext cx="233309" cy="205300"/>
+          </a:xfrm>
+          <a:prstGeom prst="rect">
+            <a:avLst/>
+          </a:prstGeom>
+        </p:spPr>
+        <p:style>
+          <a:lnRef idx="2">
+            <a:schemeClr val="accent2">
+              <a:shade val="50000"/>
+            </a:schemeClr>
+          </a:lnRef>
+          <a:fillRef idx="1">
+            <a:schemeClr val="accent2"/>
+          </a:fillRef>
+          <a:effectRef idx="0">
+            <a:schemeClr val="accent2"/>
+          </a:effectRef>
+          <a:fontRef idx="minor">
+            <a:schemeClr val="lt1"/>
+          </a:fontRef>
+        </p:style>
+        <p:txBody>
+          <a:bodyPr rtlCol="0" anchor="ctr"/>
+          <a:lstStyle/>
+          <a:p>
+            <a:pPr algn="ctr"/>
+            <a:endParaRPr lang="en-CA"/>
+          </a:p>
+        </p:txBody>
+      </p:sp>
+      <p:sp>
+        <p:nvSpPr>
+          <p:cNvPr id="46" name="TextBox 45"/>
+          <p:cNvSpPr txBox="1"/>
+          <p:nvPr/>
+        </p:nvSpPr>
+        <p:spPr>
+          <a:xfrm>
+            <a:off x="2911163" y="4725543"/>
+            <a:ext cx="808235" cy="246221"/>
+          </a:xfrm>
+          <a:prstGeom prst="rect">
+            <a:avLst/>
+          </a:prstGeom>
+          <a:noFill/>
+        </p:spPr>
+        <p:txBody>
+          <a:bodyPr wrap="none" rtlCol="0">
+            <a:spAutoFit/>
+          </a:bodyPr>
+          <a:lstStyle/>
+          <a:p>
+            <a:r>
+              <a:rPr lang="en-CA" sz="1000" dirty="0" smtClean="0"/>
+              <a:t>passageway</a:t>
+            </a:r>
+            <a:endParaRPr lang="en-CA" sz="1000" dirty="0"/>
+          </a:p>
+        </p:txBody>
+      </p:sp>
+      <p:sp>
+        <p:nvSpPr>
+          <p:cNvPr id="47" name="TextBox 3"/>
+          <p:cNvSpPr txBox="1"/>
+          <p:nvPr/>
+        </p:nvSpPr>
+        <p:spPr>
+          <a:xfrm>
+            <a:off x="1885950" y="2741196"/>
             <a:ext cx="7243764" cy="646331"/>
           </a:xfrm>
           <a:prstGeom prst="rect">
@@ -4579,7 +6691,101 @@
           <a:bodyPr wrap="square" rtlCol="0">
             <a:spAutoFit/>
           </a:bodyPr>
-          <a:lstStyle/>
+          <a:lstStyle>
+            <a:defPPr>
+              <a:defRPr lang="en-US"/>
+            </a:defPPr>
+            <a:lvl1pPr marL="0" algn="l" defTabSz="914400" rtl="0" eaLnBrk="1" latinLnBrk="0" hangingPunct="1">
+              <a:defRPr sz="1800" kern="1200">
+                <a:solidFill>
+                  <a:schemeClr val="tx1"/>
+                </a:solidFill>
+                <a:latin typeface="+mn-lt"/>
+                <a:ea typeface="+mn-ea"/>
+                <a:cs typeface="+mn-cs"/>
+              </a:defRPr>
+            </a:lvl1pPr>
+            <a:lvl2pPr marL="457200" algn="l" defTabSz="914400" rtl="0" eaLnBrk="1" latinLnBrk="0" hangingPunct="1">
+              <a:defRPr sz="1800" kern="1200">
+                <a:solidFill>
+                  <a:schemeClr val="tx1"/>
+                </a:solidFill>
+                <a:latin typeface="+mn-lt"/>
+                <a:ea typeface="+mn-ea"/>
+                <a:cs typeface="+mn-cs"/>
+              </a:defRPr>
+            </a:lvl2pPr>
+            <a:lvl3pPr marL="914400" algn="l" defTabSz="914400" rtl="0" eaLnBrk="1" latinLnBrk="0" hangingPunct="1">
+              <a:defRPr sz="1800" kern="1200">
+                <a:solidFill>
+                  <a:schemeClr val="tx1"/>
+                </a:solidFill>
+                <a:latin typeface="+mn-lt"/>
+                <a:ea typeface="+mn-ea"/>
+                <a:cs typeface="+mn-cs"/>
+              </a:defRPr>
+            </a:lvl3pPr>
+            <a:lvl4pPr marL="1371600" algn="l" defTabSz="914400" rtl="0" eaLnBrk="1" latinLnBrk="0" hangingPunct="1">
+              <a:defRPr sz="1800" kern="1200">
+                <a:solidFill>
+                  <a:schemeClr val="tx1"/>
+                </a:solidFill>
+                <a:latin typeface="+mn-lt"/>
+                <a:ea typeface="+mn-ea"/>
+                <a:cs typeface="+mn-cs"/>
+              </a:defRPr>
+            </a:lvl4pPr>
+            <a:lvl5pPr marL="1828800" algn="l" defTabSz="914400" rtl="0" eaLnBrk="1" latinLnBrk="0" hangingPunct="1">
+              <a:defRPr sz="1800" kern="1200">
+                <a:solidFill>
+                  <a:schemeClr val="tx1"/>
+                </a:solidFill>
+                <a:latin typeface="+mn-lt"/>
+                <a:ea typeface="+mn-ea"/>
+                <a:cs typeface="+mn-cs"/>
+              </a:defRPr>
+            </a:lvl5pPr>
+            <a:lvl6pPr marL="2286000" algn="l" defTabSz="914400" rtl="0" eaLnBrk="1" latinLnBrk="0" hangingPunct="1">
+              <a:defRPr sz="1800" kern="1200">
+                <a:solidFill>
+                  <a:schemeClr val="tx1"/>
+                </a:solidFill>
+                <a:latin typeface="+mn-lt"/>
+                <a:ea typeface="+mn-ea"/>
+                <a:cs typeface="+mn-cs"/>
+              </a:defRPr>
+            </a:lvl6pPr>
+            <a:lvl7pPr marL="2743200" algn="l" defTabSz="914400" rtl="0" eaLnBrk="1" latinLnBrk="0" hangingPunct="1">
+              <a:defRPr sz="1800" kern="1200">
+                <a:solidFill>
+                  <a:schemeClr val="tx1"/>
+                </a:solidFill>
+                <a:latin typeface="+mn-lt"/>
+                <a:ea typeface="+mn-ea"/>
+                <a:cs typeface="+mn-cs"/>
+              </a:defRPr>
+            </a:lvl7pPr>
+            <a:lvl8pPr marL="3200400" algn="l" defTabSz="914400" rtl="0" eaLnBrk="1" latinLnBrk="0" hangingPunct="1">
+              <a:defRPr sz="1800" kern="1200">
+                <a:solidFill>
+                  <a:schemeClr val="tx1"/>
+                </a:solidFill>
+                <a:latin typeface="+mn-lt"/>
+                <a:ea typeface="+mn-ea"/>
+                <a:cs typeface="+mn-cs"/>
+              </a:defRPr>
+            </a:lvl8pPr>
+            <a:lvl9pPr marL="3657600" algn="l" defTabSz="914400" rtl="0" eaLnBrk="1" latinLnBrk="0" hangingPunct="1">
+              <a:defRPr sz="1800" kern="1200">
+                <a:solidFill>
+                  <a:schemeClr val="tx1"/>
+                </a:solidFill>
+                <a:latin typeface="+mn-lt"/>
+                <a:ea typeface="+mn-ea"/>
+                <a:cs typeface="+mn-cs"/>
+              </a:defRPr>
+            </a:lvl9pPr>
+          </a:lstStyle>
           <a:p>
             <a:r>
               <a:rPr lang="en-CA" sz="1600" dirty="0"/>
@@ -4601,6 +6807,2264 @@
           </a:p>
           <a:p>
             <a:endParaRPr lang="en-CA" dirty="0"/>
+          </a:p>
+        </p:txBody>
+      </p:sp>
+      <p:sp>
+        <p:nvSpPr>
+          <p:cNvPr id="48" name="Rectangle 47"/>
+          <p:cNvSpPr/>
+          <p:nvPr/>
+        </p:nvSpPr>
+        <p:spPr>
+          <a:xfrm>
+            <a:off x="2820780" y="4534364"/>
+            <a:ext cx="66880" cy="151620"/>
+          </a:xfrm>
+          <a:prstGeom prst="rect">
+            <a:avLst/>
+          </a:prstGeom>
+        </p:spPr>
+        <p:style>
+          <a:lnRef idx="2">
+            <a:schemeClr val="accent1">
+              <a:shade val="50000"/>
+            </a:schemeClr>
+          </a:lnRef>
+          <a:fillRef idx="1">
+            <a:schemeClr val="accent1"/>
+          </a:fillRef>
+          <a:effectRef idx="0">
+            <a:schemeClr val="accent1"/>
+          </a:effectRef>
+          <a:fontRef idx="minor">
+            <a:schemeClr val="lt1"/>
+          </a:fontRef>
+        </p:style>
+        <p:txBody>
+          <a:bodyPr rtlCol="0" anchor="ctr"/>
+          <a:lstStyle/>
+          <a:p>
+            <a:pPr algn="ctr"/>
+            <a:endParaRPr lang="en-CA"/>
+          </a:p>
+        </p:txBody>
+      </p:sp>
+      <p:sp>
+        <p:nvSpPr>
+          <p:cNvPr id="49" name="Rectangle 48"/>
+          <p:cNvSpPr/>
+          <p:nvPr/>
+        </p:nvSpPr>
+        <p:spPr>
+          <a:xfrm>
+            <a:off x="5273675" y="3605986"/>
+            <a:ext cx="342900" cy="226636"/>
+          </a:xfrm>
+          <a:prstGeom prst="rect">
+            <a:avLst/>
+          </a:prstGeom>
+        </p:spPr>
+        <p:style>
+          <a:lnRef idx="2">
+            <a:schemeClr val="accent1">
+              <a:shade val="50000"/>
+            </a:schemeClr>
+          </a:lnRef>
+          <a:fillRef idx="1">
+            <a:schemeClr val="accent1"/>
+          </a:fillRef>
+          <a:effectRef idx="0">
+            <a:schemeClr val="accent1"/>
+          </a:effectRef>
+          <a:fontRef idx="minor">
+            <a:schemeClr val="lt1"/>
+          </a:fontRef>
+        </p:style>
+        <p:txBody>
+          <a:bodyPr rtlCol="0" anchor="ctr"/>
+          <a:lstStyle/>
+          <a:p>
+            <a:pPr algn="ctr"/>
+            <a:endParaRPr lang="en-CA"/>
+          </a:p>
+        </p:txBody>
+      </p:sp>
+      <p:sp>
+        <p:nvSpPr>
+          <p:cNvPr id="50" name="Rectangle 49"/>
+          <p:cNvSpPr/>
+          <p:nvPr/>
+        </p:nvSpPr>
+        <p:spPr>
+          <a:xfrm>
+            <a:off x="5273675" y="3848874"/>
+            <a:ext cx="342900" cy="226636"/>
+          </a:xfrm>
+          <a:prstGeom prst="rect">
+            <a:avLst/>
+          </a:prstGeom>
+        </p:spPr>
+        <p:style>
+          <a:lnRef idx="2">
+            <a:schemeClr val="accent1">
+              <a:shade val="50000"/>
+            </a:schemeClr>
+          </a:lnRef>
+          <a:fillRef idx="1">
+            <a:schemeClr val="accent1"/>
+          </a:fillRef>
+          <a:effectRef idx="0">
+            <a:schemeClr val="accent1"/>
+          </a:effectRef>
+          <a:fontRef idx="minor">
+            <a:schemeClr val="lt1"/>
+          </a:fontRef>
+        </p:style>
+        <p:txBody>
+          <a:bodyPr rtlCol="0" anchor="ctr"/>
+          <a:lstStyle/>
+          <a:p>
+            <a:pPr algn="ctr"/>
+            <a:endParaRPr lang="en-CA"/>
+          </a:p>
+        </p:txBody>
+      </p:sp>
+      <p:sp>
+        <p:nvSpPr>
+          <p:cNvPr id="51" name="Rectangle 50"/>
+          <p:cNvSpPr/>
+          <p:nvPr/>
+        </p:nvSpPr>
+        <p:spPr>
+          <a:xfrm>
+            <a:off x="5273675" y="4091762"/>
+            <a:ext cx="342900" cy="226636"/>
+          </a:xfrm>
+          <a:prstGeom prst="rect">
+            <a:avLst/>
+          </a:prstGeom>
+        </p:spPr>
+        <p:style>
+          <a:lnRef idx="2">
+            <a:schemeClr val="accent1">
+              <a:shade val="50000"/>
+            </a:schemeClr>
+          </a:lnRef>
+          <a:fillRef idx="1">
+            <a:schemeClr val="accent1"/>
+          </a:fillRef>
+          <a:effectRef idx="0">
+            <a:schemeClr val="accent1"/>
+          </a:effectRef>
+          <a:fontRef idx="minor">
+            <a:schemeClr val="lt1"/>
+          </a:fontRef>
+        </p:style>
+        <p:txBody>
+          <a:bodyPr rot="0" spcFirstLastPara="0" vert="horz" wrap="square" lIns="91440" tIns="45720" rIns="91440" bIns="45720" numCol="1" spcCol="0" rtlCol="0" fromWordArt="0" anchor="ctr" anchorCtr="0" forceAA="0" compatLnSpc="1">
+            <a:prstTxWarp prst="textNoShape">
+              <a:avLst/>
+            </a:prstTxWarp>
+            <a:noAutofit/>
+          </a:bodyPr>
+          <a:lstStyle>
+            <a:defPPr>
+              <a:defRPr lang="en-US"/>
+            </a:defPPr>
+            <a:lvl1pPr marL="0" algn="l" defTabSz="914400" rtl="0" eaLnBrk="1" latinLnBrk="0" hangingPunct="1">
+              <a:defRPr sz="1800" kern="1200">
+                <a:solidFill>
+                  <a:schemeClr val="lt1"/>
+                </a:solidFill>
+                <a:latin typeface="+mn-lt"/>
+                <a:ea typeface="+mn-ea"/>
+                <a:cs typeface="+mn-cs"/>
+              </a:defRPr>
+            </a:lvl1pPr>
+            <a:lvl2pPr marL="457200" algn="l" defTabSz="914400" rtl="0" eaLnBrk="1" latinLnBrk="0" hangingPunct="1">
+              <a:defRPr sz="1800" kern="1200">
+                <a:solidFill>
+                  <a:schemeClr val="lt1"/>
+                </a:solidFill>
+                <a:latin typeface="+mn-lt"/>
+                <a:ea typeface="+mn-ea"/>
+                <a:cs typeface="+mn-cs"/>
+              </a:defRPr>
+            </a:lvl2pPr>
+            <a:lvl3pPr marL="914400" algn="l" defTabSz="914400" rtl="0" eaLnBrk="1" latinLnBrk="0" hangingPunct="1">
+              <a:defRPr sz="1800" kern="1200">
+                <a:solidFill>
+                  <a:schemeClr val="lt1"/>
+                </a:solidFill>
+                <a:latin typeface="+mn-lt"/>
+                <a:ea typeface="+mn-ea"/>
+                <a:cs typeface="+mn-cs"/>
+              </a:defRPr>
+            </a:lvl3pPr>
+            <a:lvl4pPr marL="1371600" algn="l" defTabSz="914400" rtl="0" eaLnBrk="1" latinLnBrk="0" hangingPunct="1">
+              <a:defRPr sz="1800" kern="1200">
+                <a:solidFill>
+                  <a:schemeClr val="lt1"/>
+                </a:solidFill>
+                <a:latin typeface="+mn-lt"/>
+                <a:ea typeface="+mn-ea"/>
+                <a:cs typeface="+mn-cs"/>
+              </a:defRPr>
+            </a:lvl4pPr>
+            <a:lvl5pPr marL="1828800" algn="l" defTabSz="914400" rtl="0" eaLnBrk="1" latinLnBrk="0" hangingPunct="1">
+              <a:defRPr sz="1800" kern="1200">
+                <a:solidFill>
+                  <a:schemeClr val="lt1"/>
+                </a:solidFill>
+                <a:latin typeface="+mn-lt"/>
+                <a:ea typeface="+mn-ea"/>
+                <a:cs typeface="+mn-cs"/>
+              </a:defRPr>
+            </a:lvl5pPr>
+            <a:lvl6pPr marL="2286000" algn="l" defTabSz="914400" rtl="0" eaLnBrk="1" latinLnBrk="0" hangingPunct="1">
+              <a:defRPr sz="1800" kern="1200">
+                <a:solidFill>
+                  <a:schemeClr val="lt1"/>
+                </a:solidFill>
+                <a:latin typeface="+mn-lt"/>
+                <a:ea typeface="+mn-ea"/>
+                <a:cs typeface="+mn-cs"/>
+              </a:defRPr>
+            </a:lvl6pPr>
+            <a:lvl7pPr marL="2743200" algn="l" defTabSz="914400" rtl="0" eaLnBrk="1" latinLnBrk="0" hangingPunct="1">
+              <a:defRPr sz="1800" kern="1200">
+                <a:solidFill>
+                  <a:schemeClr val="lt1"/>
+                </a:solidFill>
+                <a:latin typeface="+mn-lt"/>
+                <a:ea typeface="+mn-ea"/>
+                <a:cs typeface="+mn-cs"/>
+              </a:defRPr>
+            </a:lvl7pPr>
+            <a:lvl8pPr marL="3200400" algn="l" defTabSz="914400" rtl="0" eaLnBrk="1" latinLnBrk="0" hangingPunct="1">
+              <a:defRPr sz="1800" kern="1200">
+                <a:solidFill>
+                  <a:schemeClr val="lt1"/>
+                </a:solidFill>
+                <a:latin typeface="+mn-lt"/>
+                <a:ea typeface="+mn-ea"/>
+                <a:cs typeface="+mn-cs"/>
+              </a:defRPr>
+            </a:lvl8pPr>
+            <a:lvl9pPr marL="3657600" algn="l" defTabSz="914400" rtl="0" eaLnBrk="1" latinLnBrk="0" hangingPunct="1">
+              <a:defRPr sz="1800" kern="1200">
+                <a:solidFill>
+                  <a:schemeClr val="lt1"/>
+                </a:solidFill>
+                <a:latin typeface="+mn-lt"/>
+                <a:ea typeface="+mn-ea"/>
+                <a:cs typeface="+mn-cs"/>
+              </a:defRPr>
+            </a:lvl9pPr>
+          </a:lstStyle>
+          <a:p>
+            <a:pPr algn="ctr"/>
+            <a:endParaRPr lang="en-CA"/>
+          </a:p>
+        </p:txBody>
+      </p:sp>
+      <p:sp>
+        <p:nvSpPr>
+          <p:cNvPr id="52" name="Rectangle 51"/>
+          <p:cNvSpPr/>
+          <p:nvPr/>
+        </p:nvSpPr>
+        <p:spPr>
+          <a:xfrm>
+            <a:off x="5273675" y="4344188"/>
+            <a:ext cx="238125" cy="152400"/>
+          </a:xfrm>
+          <a:prstGeom prst="rect">
+            <a:avLst/>
+          </a:prstGeom>
+        </p:spPr>
+        <p:style>
+          <a:lnRef idx="2">
+            <a:schemeClr val="accent2">
+              <a:shade val="50000"/>
+            </a:schemeClr>
+          </a:lnRef>
+          <a:fillRef idx="1">
+            <a:schemeClr val="accent2"/>
+          </a:fillRef>
+          <a:effectRef idx="0">
+            <a:schemeClr val="accent2"/>
+          </a:effectRef>
+          <a:fontRef idx="minor">
+            <a:schemeClr val="lt1"/>
+          </a:fontRef>
+        </p:style>
+        <p:txBody>
+          <a:bodyPr rtlCol="0" anchor="ctr"/>
+          <a:lstStyle/>
+          <a:p>
+            <a:pPr algn="ctr"/>
+            <a:endParaRPr lang="en-CA">
+              <a:solidFill>
+                <a:srgbClr val="FF0000"/>
+              </a:solidFill>
+            </a:endParaRPr>
+          </a:p>
+        </p:txBody>
+      </p:sp>
+      <p:sp>
+        <p:nvSpPr>
+          <p:cNvPr id="53" name="Rectangle 52"/>
+          <p:cNvSpPr/>
+          <p:nvPr/>
+        </p:nvSpPr>
+        <p:spPr>
+          <a:xfrm>
+            <a:off x="5253830" y="6099466"/>
+            <a:ext cx="148330" cy="52903"/>
+          </a:xfrm>
+          <a:prstGeom prst="rect">
+            <a:avLst/>
+          </a:prstGeom>
+        </p:spPr>
+        <p:style>
+          <a:lnRef idx="2">
+            <a:schemeClr val="accent6">
+              <a:shade val="50000"/>
+            </a:schemeClr>
+          </a:lnRef>
+          <a:fillRef idx="1">
+            <a:schemeClr val="accent6"/>
+          </a:fillRef>
+          <a:effectRef idx="0">
+            <a:schemeClr val="accent6"/>
+          </a:effectRef>
+          <a:fontRef idx="minor">
+            <a:schemeClr val="lt1"/>
+          </a:fontRef>
+        </p:style>
+        <p:txBody>
+          <a:bodyPr rtlCol="0" anchor="ctr"/>
+          <a:lstStyle/>
+          <a:p>
+            <a:pPr algn="ctr"/>
+            <a:endParaRPr lang="en-CA"/>
+          </a:p>
+        </p:txBody>
+      </p:sp>
+      <p:sp>
+        <p:nvSpPr>
+          <p:cNvPr id="54" name="Rectangle 53"/>
+          <p:cNvSpPr/>
+          <p:nvPr/>
+        </p:nvSpPr>
+        <p:spPr>
+          <a:xfrm>
+            <a:off x="6607074" y="5800073"/>
+            <a:ext cx="66880" cy="151620"/>
+          </a:xfrm>
+          <a:prstGeom prst="rect">
+            <a:avLst/>
+          </a:prstGeom>
+        </p:spPr>
+        <p:style>
+          <a:lnRef idx="2">
+            <a:schemeClr val="accent1">
+              <a:shade val="50000"/>
+            </a:schemeClr>
+          </a:lnRef>
+          <a:fillRef idx="1">
+            <a:schemeClr val="accent1"/>
+          </a:fillRef>
+          <a:effectRef idx="0">
+            <a:schemeClr val="accent1"/>
+          </a:effectRef>
+          <a:fontRef idx="minor">
+            <a:schemeClr val="lt1"/>
+          </a:fontRef>
+        </p:style>
+        <p:txBody>
+          <a:bodyPr rtlCol="0" anchor="ctr"/>
+          <a:lstStyle/>
+          <a:p>
+            <a:pPr algn="ctr"/>
+            <a:endParaRPr lang="en-CA"/>
+          </a:p>
+        </p:txBody>
+      </p:sp>
+      <p:sp>
+        <p:nvSpPr>
+          <p:cNvPr id="55" name="Rectangle 54"/>
+          <p:cNvSpPr/>
+          <p:nvPr/>
+        </p:nvSpPr>
+        <p:spPr>
+          <a:xfrm>
+            <a:off x="5821362" y="3605986"/>
+            <a:ext cx="342900" cy="226636"/>
+          </a:xfrm>
+          <a:prstGeom prst="rect">
+            <a:avLst/>
+          </a:prstGeom>
+        </p:spPr>
+        <p:style>
+          <a:lnRef idx="2">
+            <a:schemeClr val="accent1">
+              <a:shade val="50000"/>
+            </a:schemeClr>
+          </a:lnRef>
+          <a:fillRef idx="1">
+            <a:schemeClr val="accent1"/>
+          </a:fillRef>
+          <a:effectRef idx="0">
+            <a:schemeClr val="accent1"/>
+          </a:effectRef>
+          <a:fontRef idx="minor">
+            <a:schemeClr val="lt1"/>
+          </a:fontRef>
+        </p:style>
+        <p:txBody>
+          <a:bodyPr rtlCol="0" anchor="ctr"/>
+          <a:lstStyle/>
+          <a:p>
+            <a:pPr algn="ctr"/>
+            <a:endParaRPr lang="en-CA"/>
+          </a:p>
+        </p:txBody>
+      </p:sp>
+      <p:sp>
+        <p:nvSpPr>
+          <p:cNvPr id="56" name="Rectangle 55"/>
+          <p:cNvSpPr/>
+          <p:nvPr/>
+        </p:nvSpPr>
+        <p:spPr>
+          <a:xfrm>
+            <a:off x="5821362" y="3848874"/>
+            <a:ext cx="342900" cy="226636"/>
+          </a:xfrm>
+          <a:prstGeom prst="rect">
+            <a:avLst/>
+          </a:prstGeom>
+        </p:spPr>
+        <p:style>
+          <a:lnRef idx="3">
+            <a:schemeClr val="lt1"/>
+          </a:lnRef>
+          <a:fillRef idx="1">
+            <a:schemeClr val="accent2"/>
+          </a:fillRef>
+          <a:effectRef idx="1">
+            <a:schemeClr val="accent2"/>
+          </a:effectRef>
+          <a:fontRef idx="minor">
+            <a:schemeClr val="lt1"/>
+          </a:fontRef>
+        </p:style>
+        <p:txBody>
+          <a:bodyPr rtlCol="0" anchor="ctr"/>
+          <a:lstStyle/>
+          <a:p>
+            <a:pPr algn="ctr"/>
+            <a:endParaRPr lang="en-CA"/>
+          </a:p>
+        </p:txBody>
+      </p:sp>
+      <p:sp>
+        <p:nvSpPr>
+          <p:cNvPr id="57" name="Rectangle 56"/>
+          <p:cNvSpPr/>
+          <p:nvPr/>
+        </p:nvSpPr>
+        <p:spPr>
+          <a:xfrm>
+            <a:off x="5821362" y="4091762"/>
+            <a:ext cx="342900" cy="226636"/>
+          </a:xfrm>
+          <a:prstGeom prst="rect">
+            <a:avLst/>
+          </a:prstGeom>
+        </p:spPr>
+        <p:style>
+          <a:lnRef idx="2">
+            <a:schemeClr val="accent1">
+              <a:shade val="50000"/>
+            </a:schemeClr>
+          </a:lnRef>
+          <a:fillRef idx="1">
+            <a:schemeClr val="accent1"/>
+          </a:fillRef>
+          <a:effectRef idx="0">
+            <a:schemeClr val="accent1"/>
+          </a:effectRef>
+          <a:fontRef idx="minor">
+            <a:schemeClr val="lt1"/>
+          </a:fontRef>
+        </p:style>
+        <p:txBody>
+          <a:bodyPr rot="0" spcFirstLastPara="0" vert="horz" wrap="square" lIns="91440" tIns="45720" rIns="91440" bIns="45720" numCol="1" spcCol="0" rtlCol="0" fromWordArt="0" anchor="ctr" anchorCtr="0" forceAA="0" compatLnSpc="1">
+            <a:prstTxWarp prst="textNoShape">
+              <a:avLst/>
+            </a:prstTxWarp>
+            <a:noAutofit/>
+          </a:bodyPr>
+          <a:lstStyle>
+            <a:defPPr>
+              <a:defRPr lang="en-US"/>
+            </a:defPPr>
+            <a:lvl1pPr marL="0" algn="l" defTabSz="914400" rtl="0" eaLnBrk="1" latinLnBrk="0" hangingPunct="1">
+              <a:defRPr sz="1800" kern="1200">
+                <a:solidFill>
+                  <a:schemeClr val="lt1"/>
+                </a:solidFill>
+                <a:latin typeface="+mn-lt"/>
+                <a:ea typeface="+mn-ea"/>
+                <a:cs typeface="+mn-cs"/>
+              </a:defRPr>
+            </a:lvl1pPr>
+            <a:lvl2pPr marL="457200" algn="l" defTabSz="914400" rtl="0" eaLnBrk="1" latinLnBrk="0" hangingPunct="1">
+              <a:defRPr sz="1800" kern="1200">
+                <a:solidFill>
+                  <a:schemeClr val="lt1"/>
+                </a:solidFill>
+                <a:latin typeface="+mn-lt"/>
+                <a:ea typeface="+mn-ea"/>
+                <a:cs typeface="+mn-cs"/>
+              </a:defRPr>
+            </a:lvl2pPr>
+            <a:lvl3pPr marL="914400" algn="l" defTabSz="914400" rtl="0" eaLnBrk="1" latinLnBrk="0" hangingPunct="1">
+              <a:defRPr sz="1800" kern="1200">
+                <a:solidFill>
+                  <a:schemeClr val="lt1"/>
+                </a:solidFill>
+                <a:latin typeface="+mn-lt"/>
+                <a:ea typeface="+mn-ea"/>
+                <a:cs typeface="+mn-cs"/>
+              </a:defRPr>
+            </a:lvl3pPr>
+            <a:lvl4pPr marL="1371600" algn="l" defTabSz="914400" rtl="0" eaLnBrk="1" latinLnBrk="0" hangingPunct="1">
+              <a:defRPr sz="1800" kern="1200">
+                <a:solidFill>
+                  <a:schemeClr val="lt1"/>
+                </a:solidFill>
+                <a:latin typeface="+mn-lt"/>
+                <a:ea typeface="+mn-ea"/>
+                <a:cs typeface="+mn-cs"/>
+              </a:defRPr>
+            </a:lvl4pPr>
+            <a:lvl5pPr marL="1828800" algn="l" defTabSz="914400" rtl="0" eaLnBrk="1" latinLnBrk="0" hangingPunct="1">
+              <a:defRPr sz="1800" kern="1200">
+                <a:solidFill>
+                  <a:schemeClr val="lt1"/>
+                </a:solidFill>
+                <a:latin typeface="+mn-lt"/>
+                <a:ea typeface="+mn-ea"/>
+                <a:cs typeface="+mn-cs"/>
+              </a:defRPr>
+            </a:lvl5pPr>
+            <a:lvl6pPr marL="2286000" algn="l" defTabSz="914400" rtl="0" eaLnBrk="1" latinLnBrk="0" hangingPunct="1">
+              <a:defRPr sz="1800" kern="1200">
+                <a:solidFill>
+                  <a:schemeClr val="lt1"/>
+                </a:solidFill>
+                <a:latin typeface="+mn-lt"/>
+                <a:ea typeface="+mn-ea"/>
+                <a:cs typeface="+mn-cs"/>
+              </a:defRPr>
+            </a:lvl6pPr>
+            <a:lvl7pPr marL="2743200" algn="l" defTabSz="914400" rtl="0" eaLnBrk="1" latinLnBrk="0" hangingPunct="1">
+              <a:defRPr sz="1800" kern="1200">
+                <a:solidFill>
+                  <a:schemeClr val="lt1"/>
+                </a:solidFill>
+                <a:latin typeface="+mn-lt"/>
+                <a:ea typeface="+mn-ea"/>
+                <a:cs typeface="+mn-cs"/>
+              </a:defRPr>
+            </a:lvl7pPr>
+            <a:lvl8pPr marL="3200400" algn="l" defTabSz="914400" rtl="0" eaLnBrk="1" latinLnBrk="0" hangingPunct="1">
+              <a:defRPr sz="1800" kern="1200">
+                <a:solidFill>
+                  <a:schemeClr val="lt1"/>
+                </a:solidFill>
+                <a:latin typeface="+mn-lt"/>
+                <a:ea typeface="+mn-ea"/>
+                <a:cs typeface="+mn-cs"/>
+              </a:defRPr>
+            </a:lvl8pPr>
+            <a:lvl9pPr marL="3657600" algn="l" defTabSz="914400" rtl="0" eaLnBrk="1" latinLnBrk="0" hangingPunct="1">
+              <a:defRPr sz="1800" kern="1200">
+                <a:solidFill>
+                  <a:schemeClr val="lt1"/>
+                </a:solidFill>
+                <a:latin typeface="+mn-lt"/>
+                <a:ea typeface="+mn-ea"/>
+                <a:cs typeface="+mn-cs"/>
+              </a:defRPr>
+            </a:lvl9pPr>
+          </a:lstStyle>
+          <a:p>
+            <a:pPr algn="ctr"/>
+            <a:endParaRPr lang="en-CA"/>
+          </a:p>
+        </p:txBody>
+      </p:sp>
+      <p:sp>
+        <p:nvSpPr>
+          <p:cNvPr id="58" name="Rectangle 57"/>
+          <p:cNvSpPr/>
+          <p:nvPr/>
+        </p:nvSpPr>
+        <p:spPr>
+          <a:xfrm>
+            <a:off x="5821362" y="4340593"/>
+            <a:ext cx="238125" cy="152400"/>
+          </a:xfrm>
+          <a:prstGeom prst="rect">
+            <a:avLst/>
+          </a:prstGeom>
+        </p:spPr>
+        <p:style>
+          <a:lnRef idx="2">
+            <a:schemeClr val="accent1">
+              <a:shade val="50000"/>
+            </a:schemeClr>
+          </a:lnRef>
+          <a:fillRef idx="1">
+            <a:schemeClr val="accent1"/>
+          </a:fillRef>
+          <a:effectRef idx="0">
+            <a:schemeClr val="accent1"/>
+          </a:effectRef>
+          <a:fontRef idx="minor">
+            <a:schemeClr val="lt1"/>
+          </a:fontRef>
+        </p:style>
+        <p:txBody>
+          <a:bodyPr rtlCol="0" anchor="ctr"/>
+          <a:lstStyle/>
+          <a:p>
+            <a:pPr algn="ctr"/>
+            <a:endParaRPr lang="en-CA"/>
+          </a:p>
+        </p:txBody>
+      </p:sp>
+      <p:sp>
+        <p:nvSpPr>
+          <p:cNvPr id="59" name="Rectangle 58"/>
+          <p:cNvSpPr/>
+          <p:nvPr/>
+        </p:nvSpPr>
+        <p:spPr>
+          <a:xfrm>
+            <a:off x="5949899" y="4518597"/>
+            <a:ext cx="195417" cy="191099"/>
+          </a:xfrm>
+          <a:prstGeom prst="rect">
+            <a:avLst/>
+          </a:prstGeom>
+        </p:spPr>
+        <p:style>
+          <a:lnRef idx="2">
+            <a:schemeClr val="accent1">
+              <a:shade val="50000"/>
+            </a:schemeClr>
+          </a:lnRef>
+          <a:fillRef idx="1">
+            <a:schemeClr val="accent1"/>
+          </a:fillRef>
+          <a:effectRef idx="0">
+            <a:schemeClr val="accent1"/>
+          </a:effectRef>
+          <a:fontRef idx="minor">
+            <a:schemeClr val="lt1"/>
+          </a:fontRef>
+        </p:style>
+        <p:txBody>
+          <a:bodyPr rtlCol="0" anchor="ctr"/>
+          <a:lstStyle/>
+          <a:p>
+            <a:pPr algn="ctr"/>
+            <a:endParaRPr lang="en-CA"/>
+          </a:p>
+        </p:txBody>
+      </p:sp>
+      <p:sp>
+        <p:nvSpPr>
+          <p:cNvPr id="60" name="TextBox 59"/>
+          <p:cNvSpPr txBox="1"/>
+          <p:nvPr/>
+        </p:nvSpPr>
+        <p:spPr>
+          <a:xfrm>
+            <a:off x="5549692" y="3738147"/>
+            <a:ext cx="338554" cy="1247774"/>
+          </a:xfrm>
+          <a:prstGeom prst="rect">
+            <a:avLst/>
+          </a:prstGeom>
+          <a:noFill/>
+        </p:spPr>
+        <p:txBody>
+          <a:bodyPr vert="eaVert" wrap="square" rtlCol="0">
+            <a:spAutoFit/>
+          </a:bodyPr>
+          <a:lstStyle/>
+          <a:p>
+            <a:r>
+              <a:rPr lang="en-CA" sz="1000" dirty="0"/>
+              <a:t>passageway</a:t>
+            </a:r>
+          </a:p>
+        </p:txBody>
+      </p:sp>
+      <p:sp>
+        <p:nvSpPr>
+          <p:cNvPr id="61" name="Rectangle 60"/>
+          <p:cNvSpPr/>
+          <p:nvPr/>
+        </p:nvSpPr>
+        <p:spPr>
+          <a:xfrm>
+            <a:off x="6350104" y="3600628"/>
+            <a:ext cx="342900" cy="226636"/>
+          </a:xfrm>
+          <a:prstGeom prst="rect">
+            <a:avLst/>
+          </a:prstGeom>
+        </p:spPr>
+        <p:style>
+          <a:lnRef idx="2">
+            <a:schemeClr val="accent1">
+              <a:shade val="50000"/>
+            </a:schemeClr>
+          </a:lnRef>
+          <a:fillRef idx="1">
+            <a:schemeClr val="accent1"/>
+          </a:fillRef>
+          <a:effectRef idx="0">
+            <a:schemeClr val="accent1"/>
+          </a:effectRef>
+          <a:fontRef idx="minor">
+            <a:schemeClr val="lt1"/>
+          </a:fontRef>
+        </p:style>
+        <p:txBody>
+          <a:bodyPr rtlCol="0" anchor="ctr"/>
+          <a:lstStyle/>
+          <a:p>
+            <a:pPr algn="ctr"/>
+            <a:endParaRPr lang="en-CA"/>
+          </a:p>
+        </p:txBody>
+      </p:sp>
+      <p:sp>
+        <p:nvSpPr>
+          <p:cNvPr id="62" name="Rectangle 61"/>
+          <p:cNvSpPr/>
+          <p:nvPr/>
+        </p:nvSpPr>
+        <p:spPr>
+          <a:xfrm>
+            <a:off x="6350104" y="3843516"/>
+            <a:ext cx="342900" cy="226636"/>
+          </a:xfrm>
+          <a:prstGeom prst="rect">
+            <a:avLst/>
+          </a:prstGeom>
+        </p:spPr>
+        <p:style>
+          <a:lnRef idx="2">
+            <a:schemeClr val="accent1">
+              <a:shade val="50000"/>
+            </a:schemeClr>
+          </a:lnRef>
+          <a:fillRef idx="1">
+            <a:schemeClr val="accent1"/>
+          </a:fillRef>
+          <a:effectRef idx="0">
+            <a:schemeClr val="accent1"/>
+          </a:effectRef>
+          <a:fontRef idx="minor">
+            <a:schemeClr val="lt1"/>
+          </a:fontRef>
+        </p:style>
+        <p:txBody>
+          <a:bodyPr rtlCol="0" anchor="ctr"/>
+          <a:lstStyle/>
+          <a:p>
+            <a:pPr algn="ctr"/>
+            <a:endParaRPr lang="en-CA"/>
+          </a:p>
+        </p:txBody>
+      </p:sp>
+      <p:sp>
+        <p:nvSpPr>
+          <p:cNvPr id="63" name="Rectangle 62"/>
+          <p:cNvSpPr/>
+          <p:nvPr/>
+        </p:nvSpPr>
+        <p:spPr>
+          <a:xfrm>
+            <a:off x="6350104" y="4086404"/>
+            <a:ext cx="342900" cy="226636"/>
+          </a:xfrm>
+          <a:prstGeom prst="rect">
+            <a:avLst/>
+          </a:prstGeom>
+        </p:spPr>
+        <p:style>
+          <a:lnRef idx="2">
+            <a:schemeClr val="accent1">
+              <a:shade val="50000"/>
+            </a:schemeClr>
+          </a:lnRef>
+          <a:fillRef idx="1">
+            <a:schemeClr val="accent1"/>
+          </a:fillRef>
+          <a:effectRef idx="0">
+            <a:schemeClr val="accent1"/>
+          </a:effectRef>
+          <a:fontRef idx="minor">
+            <a:schemeClr val="lt1"/>
+          </a:fontRef>
+        </p:style>
+        <p:txBody>
+          <a:bodyPr rot="0" spcFirstLastPara="0" vert="horz" wrap="square" lIns="91440" tIns="45720" rIns="91440" bIns="45720" numCol="1" spcCol="0" rtlCol="0" fromWordArt="0" anchor="ctr" anchorCtr="0" forceAA="0" compatLnSpc="1">
+            <a:prstTxWarp prst="textNoShape">
+              <a:avLst/>
+            </a:prstTxWarp>
+            <a:noAutofit/>
+          </a:bodyPr>
+          <a:lstStyle>
+            <a:defPPr>
+              <a:defRPr lang="en-US"/>
+            </a:defPPr>
+            <a:lvl1pPr marL="0" algn="l" defTabSz="914400" rtl="0" eaLnBrk="1" latinLnBrk="0" hangingPunct="1">
+              <a:defRPr sz="1800" kern="1200">
+                <a:solidFill>
+                  <a:schemeClr val="lt1"/>
+                </a:solidFill>
+                <a:latin typeface="+mn-lt"/>
+                <a:ea typeface="+mn-ea"/>
+                <a:cs typeface="+mn-cs"/>
+              </a:defRPr>
+            </a:lvl1pPr>
+            <a:lvl2pPr marL="457200" algn="l" defTabSz="914400" rtl="0" eaLnBrk="1" latinLnBrk="0" hangingPunct="1">
+              <a:defRPr sz="1800" kern="1200">
+                <a:solidFill>
+                  <a:schemeClr val="lt1"/>
+                </a:solidFill>
+                <a:latin typeface="+mn-lt"/>
+                <a:ea typeface="+mn-ea"/>
+                <a:cs typeface="+mn-cs"/>
+              </a:defRPr>
+            </a:lvl2pPr>
+            <a:lvl3pPr marL="914400" algn="l" defTabSz="914400" rtl="0" eaLnBrk="1" latinLnBrk="0" hangingPunct="1">
+              <a:defRPr sz="1800" kern="1200">
+                <a:solidFill>
+                  <a:schemeClr val="lt1"/>
+                </a:solidFill>
+                <a:latin typeface="+mn-lt"/>
+                <a:ea typeface="+mn-ea"/>
+                <a:cs typeface="+mn-cs"/>
+              </a:defRPr>
+            </a:lvl3pPr>
+            <a:lvl4pPr marL="1371600" algn="l" defTabSz="914400" rtl="0" eaLnBrk="1" latinLnBrk="0" hangingPunct="1">
+              <a:defRPr sz="1800" kern="1200">
+                <a:solidFill>
+                  <a:schemeClr val="lt1"/>
+                </a:solidFill>
+                <a:latin typeface="+mn-lt"/>
+                <a:ea typeface="+mn-ea"/>
+                <a:cs typeface="+mn-cs"/>
+              </a:defRPr>
+            </a:lvl4pPr>
+            <a:lvl5pPr marL="1828800" algn="l" defTabSz="914400" rtl="0" eaLnBrk="1" latinLnBrk="0" hangingPunct="1">
+              <a:defRPr sz="1800" kern="1200">
+                <a:solidFill>
+                  <a:schemeClr val="lt1"/>
+                </a:solidFill>
+                <a:latin typeface="+mn-lt"/>
+                <a:ea typeface="+mn-ea"/>
+                <a:cs typeface="+mn-cs"/>
+              </a:defRPr>
+            </a:lvl5pPr>
+            <a:lvl6pPr marL="2286000" algn="l" defTabSz="914400" rtl="0" eaLnBrk="1" latinLnBrk="0" hangingPunct="1">
+              <a:defRPr sz="1800" kern="1200">
+                <a:solidFill>
+                  <a:schemeClr val="lt1"/>
+                </a:solidFill>
+                <a:latin typeface="+mn-lt"/>
+                <a:ea typeface="+mn-ea"/>
+                <a:cs typeface="+mn-cs"/>
+              </a:defRPr>
+            </a:lvl6pPr>
+            <a:lvl7pPr marL="2743200" algn="l" defTabSz="914400" rtl="0" eaLnBrk="1" latinLnBrk="0" hangingPunct="1">
+              <a:defRPr sz="1800" kern="1200">
+                <a:solidFill>
+                  <a:schemeClr val="lt1"/>
+                </a:solidFill>
+                <a:latin typeface="+mn-lt"/>
+                <a:ea typeface="+mn-ea"/>
+                <a:cs typeface="+mn-cs"/>
+              </a:defRPr>
+            </a:lvl7pPr>
+            <a:lvl8pPr marL="3200400" algn="l" defTabSz="914400" rtl="0" eaLnBrk="1" latinLnBrk="0" hangingPunct="1">
+              <a:defRPr sz="1800" kern="1200">
+                <a:solidFill>
+                  <a:schemeClr val="lt1"/>
+                </a:solidFill>
+                <a:latin typeface="+mn-lt"/>
+                <a:ea typeface="+mn-ea"/>
+                <a:cs typeface="+mn-cs"/>
+              </a:defRPr>
+            </a:lvl8pPr>
+            <a:lvl9pPr marL="3657600" algn="l" defTabSz="914400" rtl="0" eaLnBrk="1" latinLnBrk="0" hangingPunct="1">
+              <a:defRPr sz="1800" kern="1200">
+                <a:solidFill>
+                  <a:schemeClr val="lt1"/>
+                </a:solidFill>
+                <a:latin typeface="+mn-lt"/>
+                <a:ea typeface="+mn-ea"/>
+                <a:cs typeface="+mn-cs"/>
+              </a:defRPr>
+            </a:lvl9pPr>
+          </a:lstStyle>
+          <a:p>
+            <a:pPr algn="ctr"/>
+            <a:endParaRPr lang="en-CA"/>
+          </a:p>
+        </p:txBody>
+      </p:sp>
+      <p:sp>
+        <p:nvSpPr>
+          <p:cNvPr id="64" name="Rectangle 63"/>
+          <p:cNvSpPr/>
+          <p:nvPr/>
+        </p:nvSpPr>
+        <p:spPr>
+          <a:xfrm>
+            <a:off x="6350104" y="4340550"/>
+            <a:ext cx="313702" cy="152400"/>
+          </a:xfrm>
+          <a:prstGeom prst="rect">
+            <a:avLst/>
+          </a:prstGeom>
+        </p:spPr>
+        <p:style>
+          <a:lnRef idx="2">
+            <a:schemeClr val="accent1">
+              <a:shade val="50000"/>
+            </a:schemeClr>
+          </a:lnRef>
+          <a:fillRef idx="1">
+            <a:schemeClr val="accent1"/>
+          </a:fillRef>
+          <a:effectRef idx="0">
+            <a:schemeClr val="accent1"/>
+          </a:effectRef>
+          <a:fontRef idx="minor">
+            <a:schemeClr val="lt1"/>
+          </a:fontRef>
+        </p:style>
+        <p:txBody>
+          <a:bodyPr rtlCol="0" anchor="ctr"/>
+          <a:lstStyle/>
+          <a:p>
+            <a:pPr algn="ctr"/>
+            <a:endParaRPr lang="en-CA"/>
+          </a:p>
+        </p:txBody>
+      </p:sp>
+      <p:sp>
+        <p:nvSpPr>
+          <p:cNvPr id="65" name="Rectangle 64"/>
+          <p:cNvSpPr/>
+          <p:nvPr/>
+        </p:nvSpPr>
+        <p:spPr>
+          <a:xfrm>
+            <a:off x="6349899" y="4517600"/>
+            <a:ext cx="342900" cy="172642"/>
+          </a:xfrm>
+          <a:prstGeom prst="rect">
+            <a:avLst/>
+          </a:prstGeom>
+        </p:spPr>
+        <p:style>
+          <a:lnRef idx="2">
+            <a:schemeClr val="accent1">
+              <a:shade val="50000"/>
+            </a:schemeClr>
+          </a:lnRef>
+          <a:fillRef idx="1">
+            <a:schemeClr val="accent1"/>
+          </a:fillRef>
+          <a:effectRef idx="0">
+            <a:schemeClr val="accent1"/>
+          </a:effectRef>
+          <a:fontRef idx="minor">
+            <a:schemeClr val="lt1"/>
+          </a:fontRef>
+        </p:style>
+        <p:txBody>
+          <a:bodyPr rtlCol="0" anchor="ctr"/>
+          <a:lstStyle/>
+          <a:p>
+            <a:pPr algn="ctr"/>
+            <a:endParaRPr lang="en-CA"/>
+          </a:p>
+        </p:txBody>
+      </p:sp>
+      <p:sp>
+        <p:nvSpPr>
+          <p:cNvPr id="66" name="TextBox 65"/>
+          <p:cNvSpPr txBox="1"/>
+          <p:nvPr/>
+        </p:nvSpPr>
+        <p:spPr>
+          <a:xfrm>
+            <a:off x="6121141" y="3743504"/>
+            <a:ext cx="338554" cy="1247774"/>
+          </a:xfrm>
+          <a:prstGeom prst="rect">
+            <a:avLst/>
+          </a:prstGeom>
+          <a:noFill/>
+        </p:spPr>
+        <p:txBody>
+          <a:bodyPr vert="eaVert" wrap="square" rtlCol="0">
+            <a:spAutoFit/>
+          </a:bodyPr>
+          <a:lstStyle/>
+          <a:p>
+            <a:r>
+              <a:rPr lang="en-CA" sz="1000" dirty="0"/>
+              <a:t>passageway</a:t>
+            </a:r>
+          </a:p>
+        </p:txBody>
+      </p:sp>
+      <p:sp>
+        <p:nvSpPr>
+          <p:cNvPr id="67" name="Rectangle 66"/>
+          <p:cNvSpPr/>
+          <p:nvPr/>
+        </p:nvSpPr>
+        <p:spPr>
+          <a:xfrm>
+            <a:off x="5256212" y="5043706"/>
+            <a:ext cx="342900" cy="226636"/>
+          </a:xfrm>
+          <a:prstGeom prst="rect">
+            <a:avLst/>
+          </a:prstGeom>
+        </p:spPr>
+        <p:style>
+          <a:lnRef idx="2">
+            <a:schemeClr val="accent2">
+              <a:shade val="50000"/>
+            </a:schemeClr>
+          </a:lnRef>
+          <a:fillRef idx="1">
+            <a:schemeClr val="accent2"/>
+          </a:fillRef>
+          <a:effectRef idx="0">
+            <a:schemeClr val="accent2"/>
+          </a:effectRef>
+          <a:fontRef idx="minor">
+            <a:schemeClr val="lt1"/>
+          </a:fontRef>
+        </p:style>
+        <p:txBody>
+          <a:bodyPr rtlCol="0" anchor="ctr"/>
+          <a:lstStyle/>
+          <a:p>
+            <a:pPr algn="ctr"/>
+            <a:endParaRPr lang="en-CA"/>
+          </a:p>
+        </p:txBody>
+      </p:sp>
+      <p:sp>
+        <p:nvSpPr>
+          <p:cNvPr id="68" name="Rectangle 67"/>
+          <p:cNvSpPr/>
+          <p:nvPr/>
+        </p:nvSpPr>
+        <p:spPr>
+          <a:xfrm>
+            <a:off x="5254625" y="5305024"/>
+            <a:ext cx="342900" cy="226636"/>
+          </a:xfrm>
+          <a:prstGeom prst="rect">
+            <a:avLst/>
+          </a:prstGeom>
+        </p:spPr>
+        <p:style>
+          <a:lnRef idx="2">
+            <a:schemeClr val="accent1">
+              <a:shade val="50000"/>
+            </a:schemeClr>
+          </a:lnRef>
+          <a:fillRef idx="1">
+            <a:schemeClr val="accent1"/>
+          </a:fillRef>
+          <a:effectRef idx="0">
+            <a:schemeClr val="accent1"/>
+          </a:effectRef>
+          <a:fontRef idx="minor">
+            <a:schemeClr val="lt1"/>
+          </a:fontRef>
+        </p:style>
+        <p:txBody>
+          <a:bodyPr rtlCol="0" anchor="ctr"/>
+          <a:lstStyle/>
+          <a:p>
+            <a:pPr algn="ctr"/>
+            <a:endParaRPr lang="en-CA"/>
+          </a:p>
+        </p:txBody>
+      </p:sp>
+      <p:sp>
+        <p:nvSpPr>
+          <p:cNvPr id="69" name="Rectangle 68"/>
+          <p:cNvSpPr/>
+          <p:nvPr/>
+        </p:nvSpPr>
+        <p:spPr>
+          <a:xfrm>
+            <a:off x="5253830" y="5564553"/>
+            <a:ext cx="342900" cy="226636"/>
+          </a:xfrm>
+          <a:prstGeom prst="rect">
+            <a:avLst/>
+          </a:prstGeom>
+        </p:spPr>
+        <p:style>
+          <a:lnRef idx="2">
+            <a:schemeClr val="accent1">
+              <a:shade val="50000"/>
+            </a:schemeClr>
+          </a:lnRef>
+          <a:fillRef idx="1">
+            <a:schemeClr val="accent1"/>
+          </a:fillRef>
+          <a:effectRef idx="0">
+            <a:schemeClr val="accent1"/>
+          </a:effectRef>
+          <a:fontRef idx="minor">
+            <a:schemeClr val="lt1"/>
+          </a:fontRef>
+        </p:style>
+        <p:txBody>
+          <a:bodyPr rot="0" spcFirstLastPara="0" vert="horz" wrap="square" lIns="91440" tIns="45720" rIns="91440" bIns="45720" numCol="1" spcCol="0" rtlCol="0" fromWordArt="0" anchor="ctr" anchorCtr="0" forceAA="0" compatLnSpc="1">
+            <a:prstTxWarp prst="textNoShape">
+              <a:avLst/>
+            </a:prstTxWarp>
+            <a:noAutofit/>
+          </a:bodyPr>
+          <a:lstStyle>
+            <a:defPPr>
+              <a:defRPr lang="en-US"/>
+            </a:defPPr>
+            <a:lvl1pPr marL="0" algn="l" defTabSz="914400" rtl="0" eaLnBrk="1" latinLnBrk="0" hangingPunct="1">
+              <a:defRPr sz="1800" kern="1200">
+                <a:solidFill>
+                  <a:schemeClr val="lt1"/>
+                </a:solidFill>
+                <a:latin typeface="+mn-lt"/>
+                <a:ea typeface="+mn-ea"/>
+                <a:cs typeface="+mn-cs"/>
+              </a:defRPr>
+            </a:lvl1pPr>
+            <a:lvl2pPr marL="457200" algn="l" defTabSz="914400" rtl="0" eaLnBrk="1" latinLnBrk="0" hangingPunct="1">
+              <a:defRPr sz="1800" kern="1200">
+                <a:solidFill>
+                  <a:schemeClr val="lt1"/>
+                </a:solidFill>
+                <a:latin typeface="+mn-lt"/>
+                <a:ea typeface="+mn-ea"/>
+                <a:cs typeface="+mn-cs"/>
+              </a:defRPr>
+            </a:lvl2pPr>
+            <a:lvl3pPr marL="914400" algn="l" defTabSz="914400" rtl="0" eaLnBrk="1" latinLnBrk="0" hangingPunct="1">
+              <a:defRPr sz="1800" kern="1200">
+                <a:solidFill>
+                  <a:schemeClr val="lt1"/>
+                </a:solidFill>
+                <a:latin typeface="+mn-lt"/>
+                <a:ea typeface="+mn-ea"/>
+                <a:cs typeface="+mn-cs"/>
+              </a:defRPr>
+            </a:lvl3pPr>
+            <a:lvl4pPr marL="1371600" algn="l" defTabSz="914400" rtl="0" eaLnBrk="1" latinLnBrk="0" hangingPunct="1">
+              <a:defRPr sz="1800" kern="1200">
+                <a:solidFill>
+                  <a:schemeClr val="lt1"/>
+                </a:solidFill>
+                <a:latin typeface="+mn-lt"/>
+                <a:ea typeface="+mn-ea"/>
+                <a:cs typeface="+mn-cs"/>
+              </a:defRPr>
+            </a:lvl4pPr>
+            <a:lvl5pPr marL="1828800" algn="l" defTabSz="914400" rtl="0" eaLnBrk="1" latinLnBrk="0" hangingPunct="1">
+              <a:defRPr sz="1800" kern="1200">
+                <a:solidFill>
+                  <a:schemeClr val="lt1"/>
+                </a:solidFill>
+                <a:latin typeface="+mn-lt"/>
+                <a:ea typeface="+mn-ea"/>
+                <a:cs typeface="+mn-cs"/>
+              </a:defRPr>
+            </a:lvl5pPr>
+            <a:lvl6pPr marL="2286000" algn="l" defTabSz="914400" rtl="0" eaLnBrk="1" latinLnBrk="0" hangingPunct="1">
+              <a:defRPr sz="1800" kern="1200">
+                <a:solidFill>
+                  <a:schemeClr val="lt1"/>
+                </a:solidFill>
+                <a:latin typeface="+mn-lt"/>
+                <a:ea typeface="+mn-ea"/>
+                <a:cs typeface="+mn-cs"/>
+              </a:defRPr>
+            </a:lvl6pPr>
+            <a:lvl7pPr marL="2743200" algn="l" defTabSz="914400" rtl="0" eaLnBrk="1" latinLnBrk="0" hangingPunct="1">
+              <a:defRPr sz="1800" kern="1200">
+                <a:solidFill>
+                  <a:schemeClr val="lt1"/>
+                </a:solidFill>
+                <a:latin typeface="+mn-lt"/>
+                <a:ea typeface="+mn-ea"/>
+                <a:cs typeface="+mn-cs"/>
+              </a:defRPr>
+            </a:lvl7pPr>
+            <a:lvl8pPr marL="3200400" algn="l" defTabSz="914400" rtl="0" eaLnBrk="1" latinLnBrk="0" hangingPunct="1">
+              <a:defRPr sz="1800" kern="1200">
+                <a:solidFill>
+                  <a:schemeClr val="lt1"/>
+                </a:solidFill>
+                <a:latin typeface="+mn-lt"/>
+                <a:ea typeface="+mn-ea"/>
+                <a:cs typeface="+mn-cs"/>
+              </a:defRPr>
+            </a:lvl8pPr>
+            <a:lvl9pPr marL="3657600" algn="l" defTabSz="914400" rtl="0" eaLnBrk="1" latinLnBrk="0" hangingPunct="1">
+              <a:defRPr sz="1800" kern="1200">
+                <a:solidFill>
+                  <a:schemeClr val="lt1"/>
+                </a:solidFill>
+                <a:latin typeface="+mn-lt"/>
+                <a:ea typeface="+mn-ea"/>
+                <a:cs typeface="+mn-cs"/>
+              </a:defRPr>
+            </a:lvl9pPr>
+          </a:lstStyle>
+          <a:p>
+            <a:pPr algn="ctr"/>
+            <a:endParaRPr lang="en-CA"/>
+          </a:p>
+        </p:txBody>
+      </p:sp>
+      <p:sp>
+        <p:nvSpPr>
+          <p:cNvPr id="70" name="Rectangle 69"/>
+          <p:cNvSpPr/>
+          <p:nvPr/>
+        </p:nvSpPr>
+        <p:spPr>
+          <a:xfrm>
+            <a:off x="5254625" y="5810573"/>
+            <a:ext cx="238125" cy="152400"/>
+          </a:xfrm>
+          <a:prstGeom prst="rect">
+            <a:avLst/>
+          </a:prstGeom>
+        </p:spPr>
+        <p:style>
+          <a:lnRef idx="2">
+            <a:schemeClr val="accent1">
+              <a:shade val="50000"/>
+            </a:schemeClr>
+          </a:lnRef>
+          <a:fillRef idx="1">
+            <a:schemeClr val="accent1"/>
+          </a:fillRef>
+          <a:effectRef idx="0">
+            <a:schemeClr val="accent1"/>
+          </a:effectRef>
+          <a:fontRef idx="minor">
+            <a:schemeClr val="lt1"/>
+          </a:fontRef>
+        </p:style>
+        <p:txBody>
+          <a:bodyPr rtlCol="0" anchor="ctr"/>
+          <a:lstStyle/>
+          <a:p>
+            <a:pPr algn="ctr"/>
+            <a:endParaRPr lang="en-CA"/>
+          </a:p>
+        </p:txBody>
+      </p:sp>
+      <p:sp>
+        <p:nvSpPr>
+          <p:cNvPr id="71" name="Rectangle 70"/>
+          <p:cNvSpPr/>
+          <p:nvPr/>
+        </p:nvSpPr>
+        <p:spPr>
+          <a:xfrm>
+            <a:off x="5253830" y="5980585"/>
+            <a:ext cx="128588" cy="95249"/>
+          </a:xfrm>
+          <a:prstGeom prst="rect">
+            <a:avLst/>
+          </a:prstGeom>
+        </p:spPr>
+        <p:style>
+          <a:lnRef idx="2">
+            <a:schemeClr val="accent1">
+              <a:shade val="50000"/>
+            </a:schemeClr>
+          </a:lnRef>
+          <a:fillRef idx="1">
+            <a:schemeClr val="accent1"/>
+          </a:fillRef>
+          <a:effectRef idx="0">
+            <a:schemeClr val="accent1"/>
+          </a:effectRef>
+          <a:fontRef idx="minor">
+            <a:schemeClr val="lt1"/>
+          </a:fontRef>
+        </p:style>
+        <p:txBody>
+          <a:bodyPr rtlCol="0" anchor="ctr"/>
+          <a:lstStyle/>
+          <a:p>
+            <a:pPr algn="ctr"/>
+            <a:endParaRPr lang="en-CA"/>
+          </a:p>
+        </p:txBody>
+      </p:sp>
+      <p:sp>
+        <p:nvSpPr>
+          <p:cNvPr id="72" name="Rectangle 71"/>
+          <p:cNvSpPr/>
+          <p:nvPr/>
+        </p:nvSpPr>
+        <p:spPr>
+          <a:xfrm>
+            <a:off x="5402160" y="5980585"/>
+            <a:ext cx="171450" cy="172642"/>
+          </a:xfrm>
+          <a:prstGeom prst="rect">
+            <a:avLst/>
+          </a:prstGeom>
+        </p:spPr>
+        <p:style>
+          <a:lnRef idx="2">
+            <a:schemeClr val="accent1">
+              <a:shade val="50000"/>
+            </a:schemeClr>
+          </a:lnRef>
+          <a:fillRef idx="1">
+            <a:schemeClr val="accent1"/>
+          </a:fillRef>
+          <a:effectRef idx="0">
+            <a:schemeClr val="accent1"/>
+          </a:effectRef>
+          <a:fontRef idx="minor">
+            <a:schemeClr val="lt1"/>
+          </a:fontRef>
+        </p:style>
+        <p:txBody>
+          <a:bodyPr rtlCol="0" anchor="ctr"/>
+          <a:lstStyle/>
+          <a:p>
+            <a:pPr algn="ctr"/>
+            <a:endParaRPr lang="en-CA"/>
+          </a:p>
+        </p:txBody>
+      </p:sp>
+      <p:sp>
+        <p:nvSpPr>
+          <p:cNvPr id="73" name="Rectangle 72"/>
+          <p:cNvSpPr/>
+          <p:nvPr/>
+        </p:nvSpPr>
+        <p:spPr>
+          <a:xfrm>
+            <a:off x="5802312" y="5044566"/>
+            <a:ext cx="342900" cy="226636"/>
+          </a:xfrm>
+          <a:prstGeom prst="rect">
+            <a:avLst/>
+          </a:prstGeom>
+        </p:spPr>
+        <p:style>
+          <a:lnRef idx="2">
+            <a:schemeClr val="accent1">
+              <a:shade val="50000"/>
+            </a:schemeClr>
+          </a:lnRef>
+          <a:fillRef idx="1">
+            <a:schemeClr val="accent1"/>
+          </a:fillRef>
+          <a:effectRef idx="0">
+            <a:schemeClr val="accent1"/>
+          </a:effectRef>
+          <a:fontRef idx="minor">
+            <a:schemeClr val="lt1"/>
+          </a:fontRef>
+        </p:style>
+        <p:txBody>
+          <a:bodyPr rtlCol="0" anchor="ctr"/>
+          <a:lstStyle/>
+          <a:p>
+            <a:pPr algn="ctr"/>
+            <a:endParaRPr lang="en-CA"/>
+          </a:p>
+        </p:txBody>
+      </p:sp>
+      <p:sp>
+        <p:nvSpPr>
+          <p:cNvPr id="74" name="Rectangle 73"/>
+          <p:cNvSpPr/>
+          <p:nvPr/>
+        </p:nvSpPr>
+        <p:spPr>
+          <a:xfrm>
+            <a:off x="5802312" y="5301435"/>
+            <a:ext cx="342900" cy="226636"/>
+          </a:xfrm>
+          <a:prstGeom prst="rect">
+            <a:avLst/>
+          </a:prstGeom>
+        </p:spPr>
+        <p:style>
+          <a:lnRef idx="2">
+            <a:schemeClr val="accent1">
+              <a:shade val="50000"/>
+            </a:schemeClr>
+          </a:lnRef>
+          <a:fillRef idx="1">
+            <a:schemeClr val="accent1"/>
+          </a:fillRef>
+          <a:effectRef idx="0">
+            <a:schemeClr val="accent1"/>
+          </a:effectRef>
+          <a:fontRef idx="minor">
+            <a:schemeClr val="lt1"/>
+          </a:fontRef>
+        </p:style>
+        <p:txBody>
+          <a:bodyPr rtlCol="0" anchor="ctr"/>
+          <a:lstStyle/>
+          <a:p>
+            <a:pPr algn="ctr"/>
+            <a:endParaRPr lang="en-CA"/>
+          </a:p>
+        </p:txBody>
+      </p:sp>
+      <p:sp>
+        <p:nvSpPr>
+          <p:cNvPr id="75" name="Rectangle 74"/>
+          <p:cNvSpPr/>
+          <p:nvPr/>
+        </p:nvSpPr>
+        <p:spPr>
+          <a:xfrm>
+            <a:off x="5802312" y="5558579"/>
+            <a:ext cx="342900" cy="226636"/>
+          </a:xfrm>
+          <a:prstGeom prst="rect">
+            <a:avLst/>
+          </a:prstGeom>
+        </p:spPr>
+        <p:style>
+          <a:lnRef idx="2">
+            <a:schemeClr val="accent1">
+              <a:shade val="50000"/>
+            </a:schemeClr>
+          </a:lnRef>
+          <a:fillRef idx="1">
+            <a:schemeClr val="accent1"/>
+          </a:fillRef>
+          <a:effectRef idx="0">
+            <a:schemeClr val="accent1"/>
+          </a:effectRef>
+          <a:fontRef idx="minor">
+            <a:schemeClr val="lt1"/>
+          </a:fontRef>
+        </p:style>
+        <p:txBody>
+          <a:bodyPr rot="0" spcFirstLastPara="0" vert="horz" wrap="square" lIns="91440" tIns="45720" rIns="91440" bIns="45720" numCol="1" spcCol="0" rtlCol="0" fromWordArt="0" anchor="ctr" anchorCtr="0" forceAA="0" compatLnSpc="1">
+            <a:prstTxWarp prst="textNoShape">
+              <a:avLst/>
+            </a:prstTxWarp>
+            <a:noAutofit/>
+          </a:bodyPr>
+          <a:lstStyle>
+            <a:defPPr>
+              <a:defRPr lang="en-US"/>
+            </a:defPPr>
+            <a:lvl1pPr marL="0" algn="l" defTabSz="914400" rtl="0" eaLnBrk="1" latinLnBrk="0" hangingPunct="1">
+              <a:defRPr sz="1800" kern="1200">
+                <a:solidFill>
+                  <a:schemeClr val="lt1"/>
+                </a:solidFill>
+                <a:latin typeface="+mn-lt"/>
+                <a:ea typeface="+mn-ea"/>
+                <a:cs typeface="+mn-cs"/>
+              </a:defRPr>
+            </a:lvl1pPr>
+            <a:lvl2pPr marL="457200" algn="l" defTabSz="914400" rtl="0" eaLnBrk="1" latinLnBrk="0" hangingPunct="1">
+              <a:defRPr sz="1800" kern="1200">
+                <a:solidFill>
+                  <a:schemeClr val="lt1"/>
+                </a:solidFill>
+                <a:latin typeface="+mn-lt"/>
+                <a:ea typeface="+mn-ea"/>
+                <a:cs typeface="+mn-cs"/>
+              </a:defRPr>
+            </a:lvl2pPr>
+            <a:lvl3pPr marL="914400" algn="l" defTabSz="914400" rtl="0" eaLnBrk="1" latinLnBrk="0" hangingPunct="1">
+              <a:defRPr sz="1800" kern="1200">
+                <a:solidFill>
+                  <a:schemeClr val="lt1"/>
+                </a:solidFill>
+                <a:latin typeface="+mn-lt"/>
+                <a:ea typeface="+mn-ea"/>
+                <a:cs typeface="+mn-cs"/>
+              </a:defRPr>
+            </a:lvl3pPr>
+            <a:lvl4pPr marL="1371600" algn="l" defTabSz="914400" rtl="0" eaLnBrk="1" latinLnBrk="0" hangingPunct="1">
+              <a:defRPr sz="1800" kern="1200">
+                <a:solidFill>
+                  <a:schemeClr val="lt1"/>
+                </a:solidFill>
+                <a:latin typeface="+mn-lt"/>
+                <a:ea typeface="+mn-ea"/>
+                <a:cs typeface="+mn-cs"/>
+              </a:defRPr>
+            </a:lvl4pPr>
+            <a:lvl5pPr marL="1828800" algn="l" defTabSz="914400" rtl="0" eaLnBrk="1" latinLnBrk="0" hangingPunct="1">
+              <a:defRPr sz="1800" kern="1200">
+                <a:solidFill>
+                  <a:schemeClr val="lt1"/>
+                </a:solidFill>
+                <a:latin typeface="+mn-lt"/>
+                <a:ea typeface="+mn-ea"/>
+                <a:cs typeface="+mn-cs"/>
+              </a:defRPr>
+            </a:lvl5pPr>
+            <a:lvl6pPr marL="2286000" algn="l" defTabSz="914400" rtl="0" eaLnBrk="1" latinLnBrk="0" hangingPunct="1">
+              <a:defRPr sz="1800" kern="1200">
+                <a:solidFill>
+                  <a:schemeClr val="lt1"/>
+                </a:solidFill>
+                <a:latin typeface="+mn-lt"/>
+                <a:ea typeface="+mn-ea"/>
+                <a:cs typeface="+mn-cs"/>
+              </a:defRPr>
+            </a:lvl6pPr>
+            <a:lvl7pPr marL="2743200" algn="l" defTabSz="914400" rtl="0" eaLnBrk="1" latinLnBrk="0" hangingPunct="1">
+              <a:defRPr sz="1800" kern="1200">
+                <a:solidFill>
+                  <a:schemeClr val="lt1"/>
+                </a:solidFill>
+                <a:latin typeface="+mn-lt"/>
+                <a:ea typeface="+mn-ea"/>
+                <a:cs typeface="+mn-cs"/>
+              </a:defRPr>
+            </a:lvl7pPr>
+            <a:lvl8pPr marL="3200400" algn="l" defTabSz="914400" rtl="0" eaLnBrk="1" latinLnBrk="0" hangingPunct="1">
+              <a:defRPr sz="1800" kern="1200">
+                <a:solidFill>
+                  <a:schemeClr val="lt1"/>
+                </a:solidFill>
+                <a:latin typeface="+mn-lt"/>
+                <a:ea typeface="+mn-ea"/>
+                <a:cs typeface="+mn-cs"/>
+              </a:defRPr>
+            </a:lvl8pPr>
+            <a:lvl9pPr marL="3657600" algn="l" defTabSz="914400" rtl="0" eaLnBrk="1" latinLnBrk="0" hangingPunct="1">
+              <a:defRPr sz="1800" kern="1200">
+                <a:solidFill>
+                  <a:schemeClr val="lt1"/>
+                </a:solidFill>
+                <a:latin typeface="+mn-lt"/>
+                <a:ea typeface="+mn-ea"/>
+                <a:cs typeface="+mn-cs"/>
+              </a:defRPr>
+            </a:lvl9pPr>
+          </a:lstStyle>
+          <a:p>
+            <a:pPr algn="ctr"/>
+            <a:endParaRPr lang="en-CA"/>
+          </a:p>
+        </p:txBody>
+      </p:sp>
+      <p:sp>
+        <p:nvSpPr>
+          <p:cNvPr id="76" name="Rectangle 75"/>
+          <p:cNvSpPr/>
+          <p:nvPr/>
+        </p:nvSpPr>
+        <p:spPr>
+          <a:xfrm>
+            <a:off x="5805299" y="5806700"/>
+            <a:ext cx="238125" cy="152400"/>
+          </a:xfrm>
+          <a:prstGeom prst="rect">
+            <a:avLst/>
+          </a:prstGeom>
+        </p:spPr>
+        <p:style>
+          <a:lnRef idx="2">
+            <a:schemeClr val="accent1">
+              <a:shade val="50000"/>
+            </a:schemeClr>
+          </a:lnRef>
+          <a:fillRef idx="1">
+            <a:schemeClr val="accent1"/>
+          </a:fillRef>
+          <a:effectRef idx="0">
+            <a:schemeClr val="accent1"/>
+          </a:effectRef>
+          <a:fontRef idx="minor">
+            <a:schemeClr val="lt1"/>
+          </a:fontRef>
+        </p:style>
+        <p:txBody>
+          <a:bodyPr rtlCol="0" anchor="ctr"/>
+          <a:lstStyle/>
+          <a:p>
+            <a:pPr algn="ctr"/>
+            <a:endParaRPr lang="en-CA"/>
+          </a:p>
+        </p:txBody>
+      </p:sp>
+      <p:sp>
+        <p:nvSpPr>
+          <p:cNvPr id="77" name="Rectangle 76"/>
+          <p:cNvSpPr/>
+          <p:nvPr/>
+        </p:nvSpPr>
+        <p:spPr>
+          <a:xfrm>
+            <a:off x="5803848" y="5980585"/>
+            <a:ext cx="342900" cy="172642"/>
+          </a:xfrm>
+          <a:prstGeom prst="rect">
+            <a:avLst/>
+          </a:prstGeom>
+        </p:spPr>
+        <p:style>
+          <a:lnRef idx="2">
+            <a:schemeClr val="accent1">
+              <a:shade val="50000"/>
+            </a:schemeClr>
+          </a:lnRef>
+          <a:fillRef idx="1">
+            <a:schemeClr val="accent1"/>
+          </a:fillRef>
+          <a:effectRef idx="0">
+            <a:schemeClr val="accent1"/>
+          </a:effectRef>
+          <a:fontRef idx="minor">
+            <a:schemeClr val="lt1"/>
+          </a:fontRef>
+        </p:style>
+        <p:txBody>
+          <a:bodyPr rtlCol="0" anchor="ctr"/>
+          <a:lstStyle/>
+          <a:p>
+            <a:pPr algn="ctr"/>
+            <a:endParaRPr lang="en-CA"/>
+          </a:p>
+        </p:txBody>
+      </p:sp>
+      <p:sp>
+        <p:nvSpPr>
+          <p:cNvPr id="78" name="Rectangle 77"/>
+          <p:cNvSpPr/>
+          <p:nvPr/>
+        </p:nvSpPr>
+        <p:spPr>
+          <a:xfrm>
+            <a:off x="6331054" y="5067445"/>
+            <a:ext cx="342900" cy="226636"/>
+          </a:xfrm>
+          <a:prstGeom prst="rect">
+            <a:avLst/>
+          </a:prstGeom>
+        </p:spPr>
+        <p:style>
+          <a:lnRef idx="2">
+            <a:schemeClr val="accent1">
+              <a:shade val="50000"/>
+            </a:schemeClr>
+          </a:lnRef>
+          <a:fillRef idx="1">
+            <a:schemeClr val="accent1"/>
+          </a:fillRef>
+          <a:effectRef idx="0">
+            <a:schemeClr val="accent1"/>
+          </a:effectRef>
+          <a:fontRef idx="minor">
+            <a:schemeClr val="lt1"/>
+          </a:fontRef>
+        </p:style>
+        <p:txBody>
+          <a:bodyPr rtlCol="0" anchor="ctr"/>
+          <a:lstStyle/>
+          <a:p>
+            <a:pPr algn="ctr"/>
+            <a:endParaRPr lang="en-CA"/>
+          </a:p>
+        </p:txBody>
+      </p:sp>
+      <p:sp>
+        <p:nvSpPr>
+          <p:cNvPr id="79" name="Rectangle 78"/>
+          <p:cNvSpPr/>
+          <p:nvPr/>
+        </p:nvSpPr>
+        <p:spPr>
+          <a:xfrm>
+            <a:off x="6331054" y="5553221"/>
+            <a:ext cx="342900" cy="226636"/>
+          </a:xfrm>
+          <a:prstGeom prst="rect">
+            <a:avLst/>
+          </a:prstGeom>
+        </p:spPr>
+        <p:style>
+          <a:lnRef idx="2">
+            <a:schemeClr val="accent1">
+              <a:shade val="50000"/>
+            </a:schemeClr>
+          </a:lnRef>
+          <a:fillRef idx="1">
+            <a:schemeClr val="accent1"/>
+          </a:fillRef>
+          <a:effectRef idx="0">
+            <a:schemeClr val="accent1"/>
+          </a:effectRef>
+          <a:fontRef idx="minor">
+            <a:schemeClr val="lt1"/>
+          </a:fontRef>
+        </p:style>
+        <p:txBody>
+          <a:bodyPr rot="0" spcFirstLastPara="0" vert="horz" wrap="square" lIns="91440" tIns="45720" rIns="91440" bIns="45720" numCol="1" spcCol="0" rtlCol="0" fromWordArt="0" anchor="ctr" anchorCtr="0" forceAA="0" compatLnSpc="1">
+            <a:prstTxWarp prst="textNoShape">
+              <a:avLst/>
+            </a:prstTxWarp>
+            <a:noAutofit/>
+          </a:bodyPr>
+          <a:lstStyle>
+            <a:defPPr>
+              <a:defRPr lang="en-US"/>
+            </a:defPPr>
+            <a:lvl1pPr marL="0" algn="l" defTabSz="914400" rtl="0" eaLnBrk="1" latinLnBrk="0" hangingPunct="1">
+              <a:defRPr sz="1800" kern="1200">
+                <a:solidFill>
+                  <a:schemeClr val="lt1"/>
+                </a:solidFill>
+                <a:latin typeface="+mn-lt"/>
+                <a:ea typeface="+mn-ea"/>
+                <a:cs typeface="+mn-cs"/>
+              </a:defRPr>
+            </a:lvl1pPr>
+            <a:lvl2pPr marL="457200" algn="l" defTabSz="914400" rtl="0" eaLnBrk="1" latinLnBrk="0" hangingPunct="1">
+              <a:defRPr sz="1800" kern="1200">
+                <a:solidFill>
+                  <a:schemeClr val="lt1"/>
+                </a:solidFill>
+                <a:latin typeface="+mn-lt"/>
+                <a:ea typeface="+mn-ea"/>
+                <a:cs typeface="+mn-cs"/>
+              </a:defRPr>
+            </a:lvl2pPr>
+            <a:lvl3pPr marL="914400" algn="l" defTabSz="914400" rtl="0" eaLnBrk="1" latinLnBrk="0" hangingPunct="1">
+              <a:defRPr sz="1800" kern="1200">
+                <a:solidFill>
+                  <a:schemeClr val="lt1"/>
+                </a:solidFill>
+                <a:latin typeface="+mn-lt"/>
+                <a:ea typeface="+mn-ea"/>
+                <a:cs typeface="+mn-cs"/>
+              </a:defRPr>
+            </a:lvl3pPr>
+            <a:lvl4pPr marL="1371600" algn="l" defTabSz="914400" rtl="0" eaLnBrk="1" latinLnBrk="0" hangingPunct="1">
+              <a:defRPr sz="1800" kern="1200">
+                <a:solidFill>
+                  <a:schemeClr val="lt1"/>
+                </a:solidFill>
+                <a:latin typeface="+mn-lt"/>
+                <a:ea typeface="+mn-ea"/>
+                <a:cs typeface="+mn-cs"/>
+              </a:defRPr>
+            </a:lvl4pPr>
+            <a:lvl5pPr marL="1828800" algn="l" defTabSz="914400" rtl="0" eaLnBrk="1" latinLnBrk="0" hangingPunct="1">
+              <a:defRPr sz="1800" kern="1200">
+                <a:solidFill>
+                  <a:schemeClr val="lt1"/>
+                </a:solidFill>
+                <a:latin typeface="+mn-lt"/>
+                <a:ea typeface="+mn-ea"/>
+                <a:cs typeface="+mn-cs"/>
+              </a:defRPr>
+            </a:lvl5pPr>
+            <a:lvl6pPr marL="2286000" algn="l" defTabSz="914400" rtl="0" eaLnBrk="1" latinLnBrk="0" hangingPunct="1">
+              <a:defRPr sz="1800" kern="1200">
+                <a:solidFill>
+                  <a:schemeClr val="lt1"/>
+                </a:solidFill>
+                <a:latin typeface="+mn-lt"/>
+                <a:ea typeface="+mn-ea"/>
+                <a:cs typeface="+mn-cs"/>
+              </a:defRPr>
+            </a:lvl6pPr>
+            <a:lvl7pPr marL="2743200" algn="l" defTabSz="914400" rtl="0" eaLnBrk="1" latinLnBrk="0" hangingPunct="1">
+              <a:defRPr sz="1800" kern="1200">
+                <a:solidFill>
+                  <a:schemeClr val="lt1"/>
+                </a:solidFill>
+                <a:latin typeface="+mn-lt"/>
+                <a:ea typeface="+mn-ea"/>
+                <a:cs typeface="+mn-cs"/>
+              </a:defRPr>
+            </a:lvl7pPr>
+            <a:lvl8pPr marL="3200400" algn="l" defTabSz="914400" rtl="0" eaLnBrk="1" latinLnBrk="0" hangingPunct="1">
+              <a:defRPr sz="1800" kern="1200">
+                <a:solidFill>
+                  <a:schemeClr val="lt1"/>
+                </a:solidFill>
+                <a:latin typeface="+mn-lt"/>
+                <a:ea typeface="+mn-ea"/>
+                <a:cs typeface="+mn-cs"/>
+              </a:defRPr>
+            </a:lvl8pPr>
+            <a:lvl9pPr marL="3657600" algn="l" defTabSz="914400" rtl="0" eaLnBrk="1" latinLnBrk="0" hangingPunct="1">
+              <a:defRPr sz="1800" kern="1200">
+                <a:solidFill>
+                  <a:schemeClr val="lt1"/>
+                </a:solidFill>
+                <a:latin typeface="+mn-lt"/>
+                <a:ea typeface="+mn-ea"/>
+                <a:cs typeface="+mn-cs"/>
+              </a:defRPr>
+            </a:lvl9pPr>
+          </a:lstStyle>
+          <a:p>
+            <a:pPr algn="ctr"/>
+            <a:endParaRPr lang="en-CA"/>
+          </a:p>
+        </p:txBody>
+      </p:sp>
+      <p:sp>
+        <p:nvSpPr>
+          <p:cNvPr id="80" name="Rectangle 79"/>
+          <p:cNvSpPr/>
+          <p:nvPr/>
+        </p:nvSpPr>
+        <p:spPr>
+          <a:xfrm>
+            <a:off x="6331054" y="5799293"/>
+            <a:ext cx="238125" cy="152400"/>
+          </a:xfrm>
+          <a:prstGeom prst="rect">
+            <a:avLst/>
+          </a:prstGeom>
+        </p:spPr>
+        <p:style>
+          <a:lnRef idx="2">
+            <a:schemeClr val="accent1">
+              <a:shade val="50000"/>
+            </a:schemeClr>
+          </a:lnRef>
+          <a:fillRef idx="1">
+            <a:schemeClr val="accent1"/>
+          </a:fillRef>
+          <a:effectRef idx="0">
+            <a:schemeClr val="accent1"/>
+          </a:effectRef>
+          <a:fontRef idx="minor">
+            <a:schemeClr val="lt1"/>
+          </a:fontRef>
+        </p:style>
+        <p:txBody>
+          <a:bodyPr rtlCol="0" anchor="ctr"/>
+          <a:lstStyle/>
+          <a:p>
+            <a:pPr algn="ctr"/>
+            <a:endParaRPr lang="en-CA"/>
+          </a:p>
+        </p:txBody>
+      </p:sp>
+      <p:sp>
+        <p:nvSpPr>
+          <p:cNvPr id="81" name="Rectangle 80"/>
+          <p:cNvSpPr/>
+          <p:nvPr/>
+        </p:nvSpPr>
+        <p:spPr>
+          <a:xfrm>
+            <a:off x="6331054" y="5971129"/>
+            <a:ext cx="342900" cy="172642"/>
+          </a:xfrm>
+          <a:prstGeom prst="rect">
+            <a:avLst/>
+          </a:prstGeom>
+        </p:spPr>
+        <p:style>
+          <a:lnRef idx="2">
+            <a:schemeClr val="accent1">
+              <a:shade val="50000"/>
+            </a:schemeClr>
+          </a:lnRef>
+          <a:fillRef idx="1">
+            <a:schemeClr val="accent1"/>
+          </a:fillRef>
+          <a:effectRef idx="0">
+            <a:schemeClr val="accent1"/>
+          </a:effectRef>
+          <a:fontRef idx="minor">
+            <a:schemeClr val="lt1"/>
+          </a:fontRef>
+        </p:style>
+        <p:txBody>
+          <a:bodyPr rtlCol="0" anchor="ctr"/>
+          <a:lstStyle/>
+          <a:p>
+            <a:pPr algn="ctr"/>
+            <a:endParaRPr lang="en-CA"/>
+          </a:p>
+        </p:txBody>
+      </p:sp>
+      <p:sp>
+        <p:nvSpPr>
+          <p:cNvPr id="82" name="TextBox 81"/>
+          <p:cNvSpPr txBox="1"/>
+          <p:nvPr/>
+        </p:nvSpPr>
+        <p:spPr>
+          <a:xfrm>
+            <a:off x="5530538" y="5138078"/>
+            <a:ext cx="338554" cy="1247774"/>
+          </a:xfrm>
+          <a:prstGeom prst="rect">
+            <a:avLst/>
+          </a:prstGeom>
+          <a:noFill/>
+        </p:spPr>
+        <p:txBody>
+          <a:bodyPr vert="eaVert" wrap="square" rtlCol="0">
+            <a:spAutoFit/>
+          </a:bodyPr>
+          <a:lstStyle/>
+          <a:p>
+            <a:r>
+              <a:rPr lang="en-CA" sz="1000" dirty="0"/>
+              <a:t>passageway</a:t>
+            </a:r>
+          </a:p>
+        </p:txBody>
+      </p:sp>
+      <p:sp>
+        <p:nvSpPr>
+          <p:cNvPr id="83" name="TextBox 82"/>
+          <p:cNvSpPr txBox="1"/>
+          <p:nvPr/>
+        </p:nvSpPr>
+        <p:spPr>
+          <a:xfrm>
+            <a:off x="6102247" y="5138848"/>
+            <a:ext cx="338554" cy="1247774"/>
+          </a:xfrm>
+          <a:prstGeom prst="rect">
+            <a:avLst/>
+          </a:prstGeom>
+          <a:noFill/>
+        </p:spPr>
+        <p:txBody>
+          <a:bodyPr vert="eaVert" wrap="square" rtlCol="0">
+            <a:spAutoFit/>
+          </a:bodyPr>
+          <a:lstStyle/>
+          <a:p>
+            <a:r>
+              <a:rPr lang="en-CA" sz="1000" dirty="0"/>
+              <a:t>passageway</a:t>
+            </a:r>
+          </a:p>
+        </p:txBody>
+      </p:sp>
+      <p:sp>
+        <p:nvSpPr>
+          <p:cNvPr id="84" name="Rectangle 83"/>
+          <p:cNvSpPr/>
+          <p:nvPr/>
+        </p:nvSpPr>
+        <p:spPr>
+          <a:xfrm>
+            <a:off x="5821362" y="4518596"/>
+            <a:ext cx="95668" cy="191100"/>
+          </a:xfrm>
+          <a:prstGeom prst="rect">
+            <a:avLst/>
+          </a:prstGeom>
+        </p:spPr>
+        <p:style>
+          <a:lnRef idx="2">
+            <a:schemeClr val="accent1">
+              <a:shade val="50000"/>
+            </a:schemeClr>
+          </a:lnRef>
+          <a:fillRef idx="1">
+            <a:schemeClr val="accent1"/>
+          </a:fillRef>
+          <a:effectRef idx="0">
+            <a:schemeClr val="accent1"/>
+          </a:effectRef>
+          <a:fontRef idx="minor">
+            <a:schemeClr val="lt1"/>
+          </a:fontRef>
+        </p:style>
+        <p:txBody>
+          <a:bodyPr rtlCol="0" anchor="ctr"/>
+          <a:lstStyle/>
+          <a:p>
+            <a:pPr algn="ctr"/>
+            <a:endParaRPr lang="en-CA"/>
+          </a:p>
+        </p:txBody>
+      </p:sp>
+      <p:sp>
+        <p:nvSpPr>
+          <p:cNvPr id="85" name="Rectangle 84"/>
+          <p:cNvSpPr/>
+          <p:nvPr/>
+        </p:nvSpPr>
+        <p:spPr>
+          <a:xfrm>
+            <a:off x="6440645" y="5322771"/>
+            <a:ext cx="233309" cy="205300"/>
+          </a:xfrm>
+          <a:prstGeom prst="rect">
+            <a:avLst/>
+          </a:prstGeom>
+        </p:spPr>
+        <p:style>
+          <a:lnRef idx="2">
+            <a:schemeClr val="accent2">
+              <a:shade val="50000"/>
+            </a:schemeClr>
+          </a:lnRef>
+          <a:fillRef idx="1">
+            <a:schemeClr val="accent2"/>
+          </a:fillRef>
+          <a:effectRef idx="0">
+            <a:schemeClr val="accent2"/>
+          </a:effectRef>
+          <a:fontRef idx="minor">
+            <a:schemeClr val="lt1"/>
+          </a:fontRef>
+        </p:style>
+        <p:txBody>
+          <a:bodyPr rtlCol="0" anchor="ctr"/>
+          <a:lstStyle/>
+          <a:p>
+            <a:pPr algn="ctr"/>
+            <a:endParaRPr lang="en-CA"/>
+          </a:p>
+        </p:txBody>
+      </p:sp>
+      <p:sp>
+        <p:nvSpPr>
+          <p:cNvPr id="86" name="TextBox 85"/>
+          <p:cNvSpPr txBox="1"/>
+          <p:nvPr/>
+        </p:nvSpPr>
+        <p:spPr>
+          <a:xfrm>
+            <a:off x="5530538" y="4725543"/>
+            <a:ext cx="808235" cy="246221"/>
+          </a:xfrm>
+          <a:prstGeom prst="rect">
+            <a:avLst/>
+          </a:prstGeom>
+          <a:noFill/>
+        </p:spPr>
+        <p:txBody>
+          <a:bodyPr wrap="none" rtlCol="0">
+            <a:spAutoFit/>
+          </a:bodyPr>
+          <a:lstStyle/>
+          <a:p>
+            <a:r>
+              <a:rPr lang="en-CA" sz="1000" dirty="0" smtClean="0"/>
+              <a:t>passageway</a:t>
+            </a:r>
+            <a:endParaRPr lang="en-CA" sz="1000" dirty="0"/>
+          </a:p>
+        </p:txBody>
+      </p:sp>
+      <p:sp>
+        <p:nvSpPr>
+          <p:cNvPr id="87" name="Rectangle 86"/>
+          <p:cNvSpPr/>
+          <p:nvPr/>
+        </p:nvSpPr>
+        <p:spPr>
+          <a:xfrm>
+            <a:off x="5532265" y="4344188"/>
+            <a:ext cx="66880" cy="151620"/>
+          </a:xfrm>
+          <a:prstGeom prst="rect">
+            <a:avLst/>
+          </a:prstGeom>
+        </p:spPr>
+        <p:style>
+          <a:lnRef idx="2">
+            <a:schemeClr val="accent6">
+              <a:shade val="50000"/>
+            </a:schemeClr>
+          </a:lnRef>
+          <a:fillRef idx="1">
+            <a:schemeClr val="accent6"/>
+          </a:fillRef>
+          <a:effectRef idx="0">
+            <a:schemeClr val="accent6"/>
+          </a:effectRef>
+          <a:fontRef idx="minor">
+            <a:schemeClr val="lt1"/>
+          </a:fontRef>
+        </p:style>
+        <p:txBody>
+          <a:bodyPr rtlCol="0" anchor="ctr"/>
+          <a:lstStyle/>
+          <a:p>
+            <a:pPr algn="ctr"/>
+            <a:endParaRPr lang="en-CA"/>
+          </a:p>
+        </p:txBody>
+      </p:sp>
+      <p:sp>
+        <p:nvSpPr>
+          <p:cNvPr id="88" name="Rectangle 87"/>
+          <p:cNvSpPr/>
+          <p:nvPr/>
+        </p:nvSpPr>
+        <p:spPr>
+          <a:xfrm>
+            <a:off x="2639581" y="4545708"/>
+            <a:ext cx="148330" cy="52903"/>
+          </a:xfrm>
+          <a:prstGeom prst="rect">
+            <a:avLst/>
+          </a:prstGeom>
+        </p:spPr>
+        <p:style>
+          <a:lnRef idx="2">
+            <a:schemeClr val="accent1">
+              <a:shade val="50000"/>
+            </a:schemeClr>
+          </a:lnRef>
+          <a:fillRef idx="1">
+            <a:schemeClr val="accent1"/>
+          </a:fillRef>
+          <a:effectRef idx="0">
+            <a:schemeClr val="accent1"/>
+          </a:effectRef>
+          <a:fontRef idx="minor">
+            <a:schemeClr val="lt1"/>
+          </a:fontRef>
+        </p:style>
+        <p:txBody>
+          <a:bodyPr rtlCol="0" anchor="ctr"/>
+          <a:lstStyle/>
+          <a:p>
+            <a:pPr algn="ctr"/>
+            <a:endParaRPr lang="en-CA"/>
+          </a:p>
+        </p:txBody>
+      </p:sp>
+      <p:sp>
+        <p:nvSpPr>
+          <p:cNvPr id="89" name="TextBox 88"/>
+          <p:cNvSpPr txBox="1"/>
+          <p:nvPr/>
+        </p:nvSpPr>
+        <p:spPr>
+          <a:xfrm>
+            <a:off x="1671934" y="3108575"/>
+            <a:ext cx="4618484" cy="338554"/>
+          </a:xfrm>
+          <a:prstGeom prst="rect">
+            <a:avLst/>
+          </a:prstGeom>
+          <a:noFill/>
+        </p:spPr>
+        <p:txBody>
+          <a:bodyPr wrap="square" rtlCol="0">
+            <a:spAutoFit/>
+          </a:bodyPr>
+          <a:lstStyle/>
+          <a:p>
+            <a:r>
+              <a:rPr lang="en-CA" sz="800" dirty="0" smtClean="0">
+                <a:solidFill>
+                  <a:srgbClr val="FF0000"/>
+                </a:solidFill>
+              </a:rPr>
+              <a:t>The first graph is for the first algorithm challenge, the orange rectangle is the products need gather, to show we need figure out most efficient routes</a:t>
+            </a:r>
+            <a:endParaRPr lang="en-CA" sz="800" dirty="0">
+              <a:solidFill>
+                <a:srgbClr val="FF0000"/>
+              </a:solidFill>
+            </a:endParaRPr>
+          </a:p>
+        </p:txBody>
+      </p:sp>
+      <p:sp>
+        <p:nvSpPr>
+          <p:cNvPr id="90" name="TextBox 89"/>
+          <p:cNvSpPr txBox="1"/>
+          <p:nvPr/>
+        </p:nvSpPr>
+        <p:spPr>
+          <a:xfrm>
+            <a:off x="1545778" y="6408773"/>
+            <a:ext cx="4618484" cy="461665"/>
+          </a:xfrm>
+          <a:prstGeom prst="rect">
+            <a:avLst/>
+          </a:prstGeom>
+          <a:noFill/>
+        </p:spPr>
+        <p:txBody>
+          <a:bodyPr wrap="square" rtlCol="0">
+            <a:spAutoFit/>
+          </a:bodyPr>
+          <a:lstStyle/>
+          <a:p>
+            <a:r>
+              <a:rPr lang="en-CA" sz="800" dirty="0" smtClean="0">
+                <a:solidFill>
+                  <a:srgbClr val="FF0000"/>
+                </a:solidFill>
+              </a:rPr>
+              <a:t>The second graph is for the second algorithm. It is not the most efficient way to put products in the first graph. The green rectangle in the second graph is the stuff which need be moved. To show we need figure out most efficient way to put products.</a:t>
+            </a:r>
+            <a:endParaRPr lang="en-CA" sz="800" dirty="0">
+              <a:solidFill>
+                <a:srgbClr val="FF0000"/>
+              </a:solidFill>
+            </a:endParaRPr>
           </a:p>
         </p:txBody>
       </p:sp>

</xml_diff>